<commit_message>
final final project push
</commit_message>
<xml_diff>
--- a/ETL Project Presentation.pptx
+++ b/ETL Project Presentation.pptx
@@ -4,12 +4,17 @@
   <p:sldMasterIdLst>
     <p:sldMasterId id="2147483907" r:id="rId1"/>
   </p:sldMasterIdLst>
+  <p:notesMasterIdLst>
+    <p:notesMasterId r:id="rId9"/>
+  </p:notesMasterIdLst>
   <p:sldIdLst>
-    <p:sldId id="258" r:id="rId2"/>
-    <p:sldId id="257" r:id="rId3"/>
-    <p:sldId id="259" r:id="rId4"/>
-    <p:sldId id="260" r:id="rId5"/>
-    <p:sldId id="261" r:id="rId6"/>
+    <p:sldId id="262" r:id="rId2"/>
+    <p:sldId id="258" r:id="rId3"/>
+    <p:sldId id="257" r:id="rId4"/>
+    <p:sldId id="259" r:id="rId5"/>
+    <p:sldId id="260" r:id="rId6"/>
+    <p:sldId id="261" r:id="rId7"/>
+    <p:sldId id="263" r:id="rId8"/>
   </p:sldIdLst>
   <p:sldSz cx="12192000" cy="6858000"/>
   <p:notesSz cx="6858000" cy="9144000"/>
@@ -108,7 +113,991 @@
       </a:defRPr>
     </a:lvl9pPr>
   </p:defaultTextStyle>
+  <p:extLst>
+    <p:ext uri="{EFAFB233-063F-42B5-8137-9DF3F51BA10A}">
+      <p15:sldGuideLst xmlns:p15="http://schemas.microsoft.com/office/powerpoint/2012/main"/>
+    </p:ext>
+  </p:extLst>
 </p:presentation>
+</file>
+
+<file path=ppt/notesMasters/notesMaster1.xml><?xml version="1.0" encoding="utf-8"?>
+<p:notesMaster xmlns:a="http://schemas.openxmlformats.org/drawingml/2006/main" xmlns:r="http://schemas.openxmlformats.org/officeDocument/2006/relationships" xmlns:p="http://schemas.openxmlformats.org/presentationml/2006/main">
+  <p:cSld>
+    <p:bg>
+      <p:bgRef idx="1001">
+        <a:schemeClr val="bg1"/>
+      </p:bgRef>
+    </p:bg>
+    <p:spTree>
+      <p:nvGrpSpPr>
+        <p:cNvPr id="1" name=""/>
+        <p:cNvGrpSpPr/>
+        <p:nvPr/>
+      </p:nvGrpSpPr>
+      <p:grpSpPr>
+        <a:xfrm>
+          <a:off x="0" y="0"/>
+          <a:ext cx="0" cy="0"/>
+          <a:chOff x="0" y="0"/>
+          <a:chExt cx="0" cy="0"/>
+        </a:xfrm>
+      </p:grpSpPr>
+      <p:sp>
+        <p:nvSpPr>
+          <p:cNvPr id="2" name="Header Placeholder 1"/>
+          <p:cNvSpPr>
+            <a:spLocks noGrp="1"/>
+          </p:cNvSpPr>
+          <p:nvPr>
+            <p:ph type="hdr" sz="quarter"/>
+          </p:nvPr>
+        </p:nvSpPr>
+        <p:spPr>
+          <a:xfrm>
+            <a:off x="0" y="0"/>
+            <a:ext cx="2971800" cy="458788"/>
+          </a:xfrm>
+          <a:prstGeom prst="rect">
+            <a:avLst/>
+          </a:prstGeom>
+        </p:spPr>
+        <p:txBody>
+          <a:bodyPr vert="horz" lIns="91440" tIns="45720" rIns="91440" bIns="45720" rtlCol="0"/>
+          <a:lstStyle>
+            <a:lvl1pPr algn="l">
+              <a:defRPr sz="1200"/>
+            </a:lvl1pPr>
+          </a:lstStyle>
+          <a:p>
+            <a:endParaRPr lang="en-US"/>
+          </a:p>
+        </p:txBody>
+      </p:sp>
+      <p:sp>
+        <p:nvSpPr>
+          <p:cNvPr id="3" name="Date Placeholder 2"/>
+          <p:cNvSpPr>
+            <a:spLocks noGrp="1"/>
+          </p:cNvSpPr>
+          <p:nvPr>
+            <p:ph type="dt" idx="1"/>
+          </p:nvPr>
+        </p:nvSpPr>
+        <p:spPr>
+          <a:xfrm>
+            <a:off x="3884613" y="0"/>
+            <a:ext cx="2971800" cy="458788"/>
+          </a:xfrm>
+          <a:prstGeom prst="rect">
+            <a:avLst/>
+          </a:prstGeom>
+        </p:spPr>
+        <p:txBody>
+          <a:bodyPr vert="horz" lIns="91440" tIns="45720" rIns="91440" bIns="45720" rtlCol="0"/>
+          <a:lstStyle>
+            <a:lvl1pPr algn="r">
+              <a:defRPr sz="1200"/>
+            </a:lvl1pPr>
+          </a:lstStyle>
+          <a:p>
+            <a:fld id="{19245D8D-6CA0-433D-A22F-823F7BECBE2A}" type="datetimeFigureOut">
+              <a:rPr lang="en-US" smtClean="0"/>
+              <a:t>5/16/2020</a:t>
+            </a:fld>
+            <a:endParaRPr lang="en-US"/>
+          </a:p>
+        </p:txBody>
+      </p:sp>
+      <p:sp>
+        <p:nvSpPr>
+          <p:cNvPr id="4" name="Slide Image Placeholder 3"/>
+          <p:cNvSpPr>
+            <a:spLocks noGrp="1" noRot="1" noChangeAspect="1"/>
+          </p:cNvSpPr>
+          <p:nvPr>
+            <p:ph type="sldImg" idx="2"/>
+          </p:nvPr>
+        </p:nvSpPr>
+        <p:spPr>
+          <a:xfrm>
+            <a:off x="685800" y="1143000"/>
+            <a:ext cx="5486400" cy="3086100"/>
+          </a:xfrm>
+          <a:prstGeom prst="rect">
+            <a:avLst/>
+          </a:prstGeom>
+          <a:noFill/>
+          <a:ln w="12700">
+            <a:solidFill>
+              <a:prstClr val="black"/>
+            </a:solidFill>
+          </a:ln>
+        </p:spPr>
+        <p:txBody>
+          <a:bodyPr vert="horz" lIns="91440" tIns="45720" rIns="91440" bIns="45720" rtlCol="0" anchor="ctr"/>
+          <a:lstStyle/>
+          <a:p>
+            <a:endParaRPr lang="en-US"/>
+          </a:p>
+        </p:txBody>
+      </p:sp>
+      <p:sp>
+        <p:nvSpPr>
+          <p:cNvPr id="5" name="Notes Placeholder 4"/>
+          <p:cNvSpPr>
+            <a:spLocks noGrp="1"/>
+          </p:cNvSpPr>
+          <p:nvPr>
+            <p:ph type="body" sz="quarter" idx="3"/>
+          </p:nvPr>
+        </p:nvSpPr>
+        <p:spPr>
+          <a:xfrm>
+            <a:off x="685800" y="4400550"/>
+            <a:ext cx="5486400" cy="3600450"/>
+          </a:xfrm>
+          <a:prstGeom prst="rect">
+            <a:avLst/>
+          </a:prstGeom>
+        </p:spPr>
+        <p:txBody>
+          <a:bodyPr vert="horz" lIns="91440" tIns="45720" rIns="91440" bIns="45720" rtlCol="0"/>
+          <a:lstStyle/>
+          <a:p>
+            <a:pPr lvl="0"/>
+            <a:r>
+              <a:rPr lang="en-US"/>
+              <a:t>Click to edit Master text styles</a:t>
+            </a:r>
+          </a:p>
+          <a:p>
+            <a:pPr lvl="1"/>
+            <a:r>
+              <a:rPr lang="en-US"/>
+              <a:t>Second level</a:t>
+            </a:r>
+          </a:p>
+          <a:p>
+            <a:pPr lvl="2"/>
+            <a:r>
+              <a:rPr lang="en-US"/>
+              <a:t>Third level</a:t>
+            </a:r>
+          </a:p>
+          <a:p>
+            <a:pPr lvl="3"/>
+            <a:r>
+              <a:rPr lang="en-US"/>
+              <a:t>Fourth level</a:t>
+            </a:r>
+          </a:p>
+          <a:p>
+            <a:pPr lvl="4"/>
+            <a:r>
+              <a:rPr lang="en-US"/>
+              <a:t>Fifth level</a:t>
+            </a:r>
+          </a:p>
+        </p:txBody>
+      </p:sp>
+      <p:sp>
+        <p:nvSpPr>
+          <p:cNvPr id="6" name="Footer Placeholder 5"/>
+          <p:cNvSpPr>
+            <a:spLocks noGrp="1"/>
+          </p:cNvSpPr>
+          <p:nvPr>
+            <p:ph type="ftr" sz="quarter" idx="4"/>
+          </p:nvPr>
+        </p:nvSpPr>
+        <p:spPr>
+          <a:xfrm>
+            <a:off x="0" y="8685213"/>
+            <a:ext cx="2971800" cy="458787"/>
+          </a:xfrm>
+          <a:prstGeom prst="rect">
+            <a:avLst/>
+          </a:prstGeom>
+        </p:spPr>
+        <p:txBody>
+          <a:bodyPr vert="horz" lIns="91440" tIns="45720" rIns="91440" bIns="45720" rtlCol="0" anchor="b"/>
+          <a:lstStyle>
+            <a:lvl1pPr algn="l">
+              <a:defRPr sz="1200"/>
+            </a:lvl1pPr>
+          </a:lstStyle>
+          <a:p>
+            <a:endParaRPr lang="en-US"/>
+          </a:p>
+        </p:txBody>
+      </p:sp>
+      <p:sp>
+        <p:nvSpPr>
+          <p:cNvPr id="7" name="Slide Number Placeholder 6"/>
+          <p:cNvSpPr>
+            <a:spLocks noGrp="1"/>
+          </p:cNvSpPr>
+          <p:nvPr>
+            <p:ph type="sldNum" sz="quarter" idx="5"/>
+          </p:nvPr>
+        </p:nvSpPr>
+        <p:spPr>
+          <a:xfrm>
+            <a:off x="3884613" y="8685213"/>
+            <a:ext cx="2971800" cy="458787"/>
+          </a:xfrm>
+          <a:prstGeom prst="rect">
+            <a:avLst/>
+          </a:prstGeom>
+        </p:spPr>
+        <p:txBody>
+          <a:bodyPr vert="horz" lIns="91440" tIns="45720" rIns="91440" bIns="45720" rtlCol="0" anchor="b"/>
+          <a:lstStyle>
+            <a:lvl1pPr algn="r">
+              <a:defRPr sz="1200"/>
+            </a:lvl1pPr>
+          </a:lstStyle>
+          <a:p>
+            <a:fld id="{6D200C72-0EC8-464E-B557-D7B9905A301B}" type="slidenum">
+              <a:rPr lang="en-US" smtClean="0"/>
+              <a:t>‹#›</a:t>
+            </a:fld>
+            <a:endParaRPr lang="en-US"/>
+          </a:p>
+        </p:txBody>
+      </p:sp>
+    </p:spTree>
+    <p:extLst>
+      <p:ext uri="{BB962C8B-B14F-4D97-AF65-F5344CB8AC3E}">
+        <p14:creationId xmlns:p14="http://schemas.microsoft.com/office/powerpoint/2010/main" val="2256154968"/>
+      </p:ext>
+    </p:extLst>
+  </p:cSld>
+  <p:clrMap bg1="lt1" tx1="dk1" bg2="lt2" tx2="dk2" accent1="accent1" accent2="accent2" accent3="accent3" accent4="accent4" accent5="accent5" accent6="accent6" hlink="hlink" folHlink="folHlink"/>
+  <p:notesStyle>
+    <a:lvl1pPr marL="0" algn="l" defTabSz="914400" rtl="0" eaLnBrk="1" latinLnBrk="0" hangingPunct="1">
+      <a:defRPr sz="1200" kern="1200">
+        <a:solidFill>
+          <a:schemeClr val="tx1"/>
+        </a:solidFill>
+        <a:latin typeface="+mn-lt"/>
+        <a:ea typeface="+mn-ea"/>
+        <a:cs typeface="+mn-cs"/>
+      </a:defRPr>
+    </a:lvl1pPr>
+    <a:lvl2pPr marL="457200" algn="l" defTabSz="914400" rtl="0" eaLnBrk="1" latinLnBrk="0" hangingPunct="1">
+      <a:defRPr sz="1200" kern="1200">
+        <a:solidFill>
+          <a:schemeClr val="tx1"/>
+        </a:solidFill>
+        <a:latin typeface="+mn-lt"/>
+        <a:ea typeface="+mn-ea"/>
+        <a:cs typeface="+mn-cs"/>
+      </a:defRPr>
+    </a:lvl2pPr>
+    <a:lvl3pPr marL="914400" algn="l" defTabSz="914400" rtl="0" eaLnBrk="1" latinLnBrk="0" hangingPunct="1">
+      <a:defRPr sz="1200" kern="1200">
+        <a:solidFill>
+          <a:schemeClr val="tx1"/>
+        </a:solidFill>
+        <a:latin typeface="+mn-lt"/>
+        <a:ea typeface="+mn-ea"/>
+        <a:cs typeface="+mn-cs"/>
+      </a:defRPr>
+    </a:lvl3pPr>
+    <a:lvl4pPr marL="1371600" algn="l" defTabSz="914400" rtl="0" eaLnBrk="1" latinLnBrk="0" hangingPunct="1">
+      <a:defRPr sz="1200" kern="1200">
+        <a:solidFill>
+          <a:schemeClr val="tx1"/>
+        </a:solidFill>
+        <a:latin typeface="+mn-lt"/>
+        <a:ea typeface="+mn-ea"/>
+        <a:cs typeface="+mn-cs"/>
+      </a:defRPr>
+    </a:lvl4pPr>
+    <a:lvl5pPr marL="1828800" algn="l" defTabSz="914400" rtl="0" eaLnBrk="1" latinLnBrk="0" hangingPunct="1">
+      <a:defRPr sz="1200" kern="1200">
+        <a:solidFill>
+          <a:schemeClr val="tx1"/>
+        </a:solidFill>
+        <a:latin typeface="+mn-lt"/>
+        <a:ea typeface="+mn-ea"/>
+        <a:cs typeface="+mn-cs"/>
+      </a:defRPr>
+    </a:lvl5pPr>
+    <a:lvl6pPr marL="2286000" algn="l" defTabSz="914400" rtl="0" eaLnBrk="1" latinLnBrk="0" hangingPunct="1">
+      <a:defRPr sz="1200" kern="1200">
+        <a:solidFill>
+          <a:schemeClr val="tx1"/>
+        </a:solidFill>
+        <a:latin typeface="+mn-lt"/>
+        <a:ea typeface="+mn-ea"/>
+        <a:cs typeface="+mn-cs"/>
+      </a:defRPr>
+    </a:lvl6pPr>
+    <a:lvl7pPr marL="2743200" algn="l" defTabSz="914400" rtl="0" eaLnBrk="1" latinLnBrk="0" hangingPunct="1">
+      <a:defRPr sz="1200" kern="1200">
+        <a:solidFill>
+          <a:schemeClr val="tx1"/>
+        </a:solidFill>
+        <a:latin typeface="+mn-lt"/>
+        <a:ea typeface="+mn-ea"/>
+        <a:cs typeface="+mn-cs"/>
+      </a:defRPr>
+    </a:lvl7pPr>
+    <a:lvl8pPr marL="3200400" algn="l" defTabSz="914400" rtl="0" eaLnBrk="1" latinLnBrk="0" hangingPunct="1">
+      <a:defRPr sz="1200" kern="1200">
+        <a:solidFill>
+          <a:schemeClr val="tx1"/>
+        </a:solidFill>
+        <a:latin typeface="+mn-lt"/>
+        <a:ea typeface="+mn-ea"/>
+        <a:cs typeface="+mn-cs"/>
+      </a:defRPr>
+    </a:lvl8pPr>
+    <a:lvl9pPr marL="3657600" algn="l" defTabSz="914400" rtl="0" eaLnBrk="1" latinLnBrk="0" hangingPunct="1">
+      <a:defRPr sz="1200" kern="1200">
+        <a:solidFill>
+          <a:schemeClr val="tx1"/>
+        </a:solidFill>
+        <a:latin typeface="+mn-lt"/>
+        <a:ea typeface="+mn-ea"/>
+        <a:cs typeface="+mn-cs"/>
+      </a:defRPr>
+    </a:lvl9pPr>
+  </p:notesStyle>
+</p:notesMaster>
+</file>
+
+<file path=ppt/notesSlides/notesSlide1.xml><?xml version="1.0" encoding="utf-8"?>
+<p:notes xmlns:a="http://schemas.openxmlformats.org/drawingml/2006/main" xmlns:r="http://schemas.openxmlformats.org/officeDocument/2006/relationships" xmlns:p="http://schemas.openxmlformats.org/presentationml/2006/main">
+  <p:cSld>
+    <p:spTree>
+      <p:nvGrpSpPr>
+        <p:cNvPr id="1" name=""/>
+        <p:cNvGrpSpPr/>
+        <p:nvPr/>
+      </p:nvGrpSpPr>
+      <p:grpSpPr>
+        <a:xfrm>
+          <a:off x="0" y="0"/>
+          <a:ext cx="0" cy="0"/>
+          <a:chOff x="0" y="0"/>
+          <a:chExt cx="0" cy="0"/>
+        </a:xfrm>
+      </p:grpSpPr>
+      <p:sp>
+        <p:nvSpPr>
+          <p:cNvPr id="2" name="Slide Image Placeholder 1"/>
+          <p:cNvSpPr>
+            <a:spLocks noGrp="1" noRot="1" noChangeAspect="1"/>
+          </p:cNvSpPr>
+          <p:nvPr>
+            <p:ph type="sldImg"/>
+          </p:nvPr>
+        </p:nvSpPr>
+        <p:spPr/>
+      </p:sp>
+      <p:sp>
+        <p:nvSpPr>
+          <p:cNvPr id="3" name="Notes Placeholder 2"/>
+          <p:cNvSpPr>
+            <a:spLocks noGrp="1"/>
+          </p:cNvSpPr>
+          <p:nvPr>
+            <p:ph type="body" idx="1"/>
+          </p:nvPr>
+        </p:nvSpPr>
+        <p:spPr/>
+        <p:txBody>
+          <a:bodyPr/>
+          <a:lstStyle/>
+          <a:p>
+            <a:r>
+              <a:rPr lang="en-US" dirty="0"/>
+              <a:t>-downloaded two CSVs</a:t>
+            </a:r>
+          </a:p>
+          <a:p>
+            <a:pPr marL="0" marR="0" lvl="0" indent="0" algn="l" defTabSz="914400" rtl="0" eaLnBrk="1" fontAlgn="auto" latinLnBrk="0" hangingPunct="1">
+              <a:lnSpc>
+                <a:spcPct val="100000"/>
+              </a:lnSpc>
+              <a:spcBef>
+                <a:spcPts val="0"/>
+              </a:spcBef>
+              <a:spcAft>
+                <a:spcPts val="0"/>
+              </a:spcAft>
+              <a:buClrTx/>
+              <a:buSzTx/>
+              <a:buFontTx/>
+              <a:buNone/>
+              <a:tabLst/>
+              <a:defRPr/>
+            </a:pPr>
+            <a:r>
+              <a:rPr lang="en-US" sz="1200" kern="1200" dirty="0">
+                <a:solidFill>
+                  <a:schemeClr val="tx1"/>
+                </a:solidFill>
+                <a:effectLst/>
+                <a:latin typeface="+mn-lt"/>
+                <a:ea typeface="+mn-ea"/>
+                <a:cs typeface="+mn-cs"/>
+              </a:rPr>
+              <a:t>-The first data set was the smoking prevalence as a percent per country. The second was the life expectance in years per country. </a:t>
+            </a:r>
+          </a:p>
+          <a:p>
+            <a:pPr marL="0" marR="0" lvl="0" indent="0" algn="l" defTabSz="914400" rtl="0" eaLnBrk="1" fontAlgn="auto" latinLnBrk="0" hangingPunct="1">
+              <a:lnSpc>
+                <a:spcPct val="100000"/>
+              </a:lnSpc>
+              <a:spcBef>
+                <a:spcPts val="0"/>
+              </a:spcBef>
+              <a:spcAft>
+                <a:spcPts val="0"/>
+              </a:spcAft>
+              <a:buClrTx/>
+              <a:buSzTx/>
+              <a:buFontTx/>
+              <a:buNone/>
+              <a:tabLst/>
+              <a:defRPr/>
+            </a:pPr>
+            <a:r>
+              <a:rPr lang="en-US" sz="1200" kern="1200" dirty="0">
+                <a:solidFill>
+                  <a:schemeClr val="tx1"/>
+                </a:solidFill>
+                <a:effectLst/>
+                <a:latin typeface="+mn-lt"/>
+                <a:ea typeface="+mn-ea"/>
+                <a:cs typeface="+mn-cs"/>
+              </a:rPr>
+              <a:t>-I was hoping to find a correlation between the two sets by pulling into one table both pieces of data from two different years and seeing if smoking trending down correlated to life expectancy trending up.</a:t>
+            </a:r>
+          </a:p>
+          <a:p>
+            <a:endParaRPr lang="en-US" dirty="0"/>
+          </a:p>
+          <a:p>
+            <a:endParaRPr lang="en-US" dirty="0"/>
+          </a:p>
+        </p:txBody>
+      </p:sp>
+      <p:sp>
+        <p:nvSpPr>
+          <p:cNvPr id="4" name="Slide Number Placeholder 3"/>
+          <p:cNvSpPr>
+            <a:spLocks noGrp="1"/>
+          </p:cNvSpPr>
+          <p:nvPr>
+            <p:ph type="sldNum" sz="quarter" idx="5"/>
+          </p:nvPr>
+        </p:nvSpPr>
+        <p:spPr/>
+        <p:txBody>
+          <a:bodyPr/>
+          <a:lstStyle/>
+          <a:p>
+            <a:fld id="{6D200C72-0EC8-464E-B557-D7B9905A301B}" type="slidenum">
+              <a:rPr lang="en-US" smtClean="0"/>
+              <a:t>2</a:t>
+            </a:fld>
+            <a:endParaRPr lang="en-US"/>
+          </a:p>
+        </p:txBody>
+      </p:sp>
+    </p:spTree>
+    <p:extLst>
+      <p:ext uri="{BB962C8B-B14F-4D97-AF65-F5344CB8AC3E}">
+        <p14:creationId xmlns:p14="http://schemas.microsoft.com/office/powerpoint/2010/main" val="1053967563"/>
+      </p:ext>
+    </p:extLst>
+  </p:cSld>
+  <p:clrMapOvr>
+    <a:masterClrMapping/>
+  </p:clrMapOvr>
+</p:notes>
+</file>
+
+<file path=ppt/notesSlides/notesSlide2.xml><?xml version="1.0" encoding="utf-8"?>
+<p:notes xmlns:a="http://schemas.openxmlformats.org/drawingml/2006/main" xmlns:r="http://schemas.openxmlformats.org/officeDocument/2006/relationships" xmlns:p="http://schemas.openxmlformats.org/presentationml/2006/main">
+  <p:cSld>
+    <p:spTree>
+      <p:nvGrpSpPr>
+        <p:cNvPr id="1" name=""/>
+        <p:cNvGrpSpPr/>
+        <p:nvPr/>
+      </p:nvGrpSpPr>
+      <p:grpSpPr>
+        <a:xfrm>
+          <a:off x="0" y="0"/>
+          <a:ext cx="0" cy="0"/>
+          <a:chOff x="0" y="0"/>
+          <a:chExt cx="0" cy="0"/>
+        </a:xfrm>
+      </p:grpSpPr>
+      <p:sp>
+        <p:nvSpPr>
+          <p:cNvPr id="2" name="Slide Image Placeholder 1"/>
+          <p:cNvSpPr>
+            <a:spLocks noGrp="1" noRot="1" noChangeAspect="1"/>
+          </p:cNvSpPr>
+          <p:nvPr>
+            <p:ph type="sldImg"/>
+          </p:nvPr>
+        </p:nvSpPr>
+        <p:spPr/>
+      </p:sp>
+      <p:sp>
+        <p:nvSpPr>
+          <p:cNvPr id="3" name="Notes Placeholder 2"/>
+          <p:cNvSpPr>
+            <a:spLocks noGrp="1"/>
+          </p:cNvSpPr>
+          <p:nvPr>
+            <p:ph type="body" idx="1"/>
+          </p:nvPr>
+        </p:nvSpPr>
+        <p:spPr/>
+        <p:txBody>
+          <a:bodyPr/>
+          <a:lstStyle/>
+          <a:p>
+            <a:r>
+              <a:rPr lang="en-US" dirty="0"/>
+              <a:t>- Extracted into CSV</a:t>
+            </a:r>
+          </a:p>
+        </p:txBody>
+      </p:sp>
+      <p:sp>
+        <p:nvSpPr>
+          <p:cNvPr id="4" name="Slide Number Placeholder 3"/>
+          <p:cNvSpPr>
+            <a:spLocks noGrp="1"/>
+          </p:cNvSpPr>
+          <p:nvPr>
+            <p:ph type="sldNum" sz="quarter" idx="5"/>
+          </p:nvPr>
+        </p:nvSpPr>
+        <p:spPr/>
+        <p:txBody>
+          <a:bodyPr/>
+          <a:lstStyle/>
+          <a:p>
+            <a:fld id="{6D200C72-0EC8-464E-B557-D7B9905A301B}" type="slidenum">
+              <a:rPr lang="en-US" smtClean="0"/>
+              <a:t>3</a:t>
+            </a:fld>
+            <a:endParaRPr lang="en-US"/>
+          </a:p>
+        </p:txBody>
+      </p:sp>
+    </p:spTree>
+    <p:extLst>
+      <p:ext uri="{BB962C8B-B14F-4D97-AF65-F5344CB8AC3E}">
+        <p14:creationId xmlns:p14="http://schemas.microsoft.com/office/powerpoint/2010/main" val="4078829350"/>
+      </p:ext>
+    </p:extLst>
+  </p:cSld>
+  <p:clrMapOvr>
+    <a:masterClrMapping/>
+  </p:clrMapOvr>
+</p:notes>
+</file>
+
+<file path=ppt/notesSlides/notesSlide3.xml><?xml version="1.0" encoding="utf-8"?>
+<p:notes xmlns:a="http://schemas.openxmlformats.org/drawingml/2006/main" xmlns:r="http://schemas.openxmlformats.org/officeDocument/2006/relationships" xmlns:p="http://schemas.openxmlformats.org/presentationml/2006/main">
+  <p:cSld>
+    <p:spTree>
+      <p:nvGrpSpPr>
+        <p:cNvPr id="1" name=""/>
+        <p:cNvGrpSpPr/>
+        <p:nvPr/>
+      </p:nvGrpSpPr>
+      <p:grpSpPr>
+        <a:xfrm>
+          <a:off x="0" y="0"/>
+          <a:ext cx="0" cy="0"/>
+          <a:chOff x="0" y="0"/>
+          <a:chExt cx="0" cy="0"/>
+        </a:xfrm>
+      </p:grpSpPr>
+      <p:sp>
+        <p:nvSpPr>
+          <p:cNvPr id="2" name="Slide Image Placeholder 1"/>
+          <p:cNvSpPr>
+            <a:spLocks noGrp="1" noRot="1" noChangeAspect="1"/>
+          </p:cNvSpPr>
+          <p:nvPr>
+            <p:ph type="sldImg"/>
+          </p:nvPr>
+        </p:nvSpPr>
+        <p:spPr/>
+      </p:sp>
+      <p:sp>
+        <p:nvSpPr>
+          <p:cNvPr id="3" name="Notes Placeholder 2"/>
+          <p:cNvSpPr>
+            <a:spLocks noGrp="1"/>
+          </p:cNvSpPr>
+          <p:nvPr>
+            <p:ph type="body" idx="1"/>
+          </p:nvPr>
+        </p:nvSpPr>
+        <p:spPr/>
+        <p:txBody>
+          <a:bodyPr/>
+          <a:lstStyle/>
+          <a:p>
+            <a:pPr marL="171450" indent="-171450">
+              <a:buFontTx/>
+              <a:buChar char="-"/>
+            </a:pPr>
+            <a:r>
+              <a:rPr lang="en-US" dirty="0"/>
+              <a:t>Third normal form since the data had country code (3 letters) and country name.</a:t>
+            </a:r>
+          </a:p>
+          <a:p>
+            <a:pPr marL="171450" indent="-171450">
+              <a:buFontTx/>
+              <a:buChar char="-"/>
+            </a:pPr>
+            <a:r>
+              <a:rPr lang="en-US" dirty="0"/>
+              <a:t>Pulled columns I wanted, country code and the years representing columns of data</a:t>
+            </a:r>
+          </a:p>
+          <a:p>
+            <a:pPr marL="171450" indent="-171450">
+              <a:buFontTx/>
+              <a:buChar char="-"/>
+            </a:pPr>
+            <a:r>
+              <a:rPr lang="en-US" dirty="0"/>
+              <a:t>Cleaned the data by replacing the empty cell double periods with the string “</a:t>
+            </a:r>
+            <a:r>
+              <a:rPr lang="en-US" dirty="0" err="1"/>
+              <a:t>NaN</a:t>
+            </a:r>
+            <a:r>
+              <a:rPr lang="en-US" dirty="0"/>
+              <a:t>”</a:t>
+            </a:r>
+          </a:p>
+          <a:p>
+            <a:pPr marL="628650" lvl="1" indent="-171450">
+              <a:buFontTx/>
+              <a:buChar char="-"/>
+            </a:pPr>
+            <a:r>
+              <a:rPr lang="en-US" dirty="0"/>
+              <a:t>Had to use “</a:t>
+            </a:r>
+            <a:r>
+              <a:rPr lang="en-US" dirty="0" err="1"/>
+              <a:t>NaN</a:t>
+            </a:r>
+            <a:r>
+              <a:rPr lang="en-US" dirty="0"/>
+              <a:t>” because the SQL </a:t>
+            </a:r>
+            <a:r>
+              <a:rPr lang="en-US" dirty="0" err="1"/>
+              <a:t>postgres</a:t>
+            </a:r>
+            <a:r>
+              <a:rPr lang="en-US" dirty="0"/>
+              <a:t> server utilized this value for null values of a REAL number, this way I could load in the data without getting an error.</a:t>
+            </a:r>
+          </a:p>
+        </p:txBody>
+      </p:sp>
+      <p:sp>
+        <p:nvSpPr>
+          <p:cNvPr id="4" name="Slide Number Placeholder 3"/>
+          <p:cNvSpPr>
+            <a:spLocks noGrp="1"/>
+          </p:cNvSpPr>
+          <p:nvPr>
+            <p:ph type="sldNum" sz="quarter" idx="5"/>
+          </p:nvPr>
+        </p:nvSpPr>
+        <p:spPr/>
+        <p:txBody>
+          <a:bodyPr/>
+          <a:lstStyle/>
+          <a:p>
+            <a:fld id="{6D200C72-0EC8-464E-B557-D7B9905A301B}" type="slidenum">
+              <a:rPr lang="en-US" smtClean="0"/>
+              <a:t>4</a:t>
+            </a:fld>
+            <a:endParaRPr lang="en-US"/>
+          </a:p>
+        </p:txBody>
+      </p:sp>
+    </p:spTree>
+    <p:extLst>
+      <p:ext uri="{BB962C8B-B14F-4D97-AF65-F5344CB8AC3E}">
+        <p14:creationId xmlns:p14="http://schemas.microsoft.com/office/powerpoint/2010/main" val="778342700"/>
+      </p:ext>
+    </p:extLst>
+  </p:cSld>
+  <p:clrMapOvr>
+    <a:masterClrMapping/>
+  </p:clrMapOvr>
+</p:notes>
+</file>
+
+<file path=ppt/notesSlides/notesSlide4.xml><?xml version="1.0" encoding="utf-8"?>
+<p:notes xmlns:a="http://schemas.openxmlformats.org/drawingml/2006/main" xmlns:r="http://schemas.openxmlformats.org/officeDocument/2006/relationships" xmlns:p="http://schemas.openxmlformats.org/presentationml/2006/main">
+  <p:cSld>
+    <p:spTree>
+      <p:nvGrpSpPr>
+        <p:cNvPr id="1" name=""/>
+        <p:cNvGrpSpPr/>
+        <p:nvPr/>
+      </p:nvGrpSpPr>
+      <p:grpSpPr>
+        <a:xfrm>
+          <a:off x="0" y="0"/>
+          <a:ext cx="0" cy="0"/>
+          <a:chOff x="0" y="0"/>
+          <a:chExt cx="0" cy="0"/>
+        </a:xfrm>
+      </p:grpSpPr>
+      <p:sp>
+        <p:nvSpPr>
+          <p:cNvPr id="2" name="Slide Image Placeholder 1"/>
+          <p:cNvSpPr>
+            <a:spLocks noGrp="1" noRot="1" noChangeAspect="1"/>
+          </p:cNvSpPr>
+          <p:nvPr>
+            <p:ph type="sldImg"/>
+          </p:nvPr>
+        </p:nvSpPr>
+        <p:spPr/>
+      </p:sp>
+      <p:sp>
+        <p:nvSpPr>
+          <p:cNvPr id="3" name="Notes Placeholder 2"/>
+          <p:cNvSpPr>
+            <a:spLocks noGrp="1"/>
+          </p:cNvSpPr>
+          <p:nvPr>
+            <p:ph type="body" idx="1"/>
+          </p:nvPr>
+        </p:nvSpPr>
+        <p:spPr/>
+        <p:txBody>
+          <a:bodyPr/>
+          <a:lstStyle/>
+          <a:p>
+            <a:pPr marL="171450" indent="-171450">
+              <a:buFontTx/>
+              <a:buChar char="-"/>
+            </a:pPr>
+            <a:r>
+              <a:rPr lang="en-US" dirty="0"/>
+              <a:t>Initialized table in Postgres, sample on screen</a:t>
+            </a:r>
+          </a:p>
+          <a:p>
+            <a:pPr marL="171450" indent="-171450">
+              <a:buFontTx/>
+              <a:buChar char="-"/>
+            </a:pPr>
+            <a:r>
+              <a:rPr lang="en-US" dirty="0"/>
+              <a:t>Create connection and load into Postgres</a:t>
+            </a:r>
+          </a:p>
+        </p:txBody>
+      </p:sp>
+      <p:sp>
+        <p:nvSpPr>
+          <p:cNvPr id="4" name="Slide Number Placeholder 3"/>
+          <p:cNvSpPr>
+            <a:spLocks noGrp="1"/>
+          </p:cNvSpPr>
+          <p:nvPr>
+            <p:ph type="sldNum" sz="quarter" idx="5"/>
+          </p:nvPr>
+        </p:nvSpPr>
+        <p:spPr/>
+        <p:txBody>
+          <a:bodyPr/>
+          <a:lstStyle/>
+          <a:p>
+            <a:fld id="{6D200C72-0EC8-464E-B557-D7B9905A301B}" type="slidenum">
+              <a:rPr lang="en-US" smtClean="0"/>
+              <a:t>5</a:t>
+            </a:fld>
+            <a:endParaRPr lang="en-US"/>
+          </a:p>
+        </p:txBody>
+      </p:sp>
+    </p:spTree>
+    <p:extLst>
+      <p:ext uri="{BB962C8B-B14F-4D97-AF65-F5344CB8AC3E}">
+        <p14:creationId xmlns:p14="http://schemas.microsoft.com/office/powerpoint/2010/main" val="589988161"/>
+      </p:ext>
+    </p:extLst>
+  </p:cSld>
+  <p:clrMapOvr>
+    <a:masterClrMapping/>
+  </p:clrMapOvr>
+</p:notes>
+</file>
+
+<file path=ppt/notesSlides/notesSlide5.xml><?xml version="1.0" encoding="utf-8"?>
+<p:notes xmlns:a="http://schemas.openxmlformats.org/drawingml/2006/main" xmlns:r="http://schemas.openxmlformats.org/officeDocument/2006/relationships" xmlns:p="http://schemas.openxmlformats.org/presentationml/2006/main">
+  <p:cSld>
+    <p:spTree>
+      <p:nvGrpSpPr>
+        <p:cNvPr id="1" name=""/>
+        <p:cNvGrpSpPr/>
+        <p:nvPr/>
+      </p:nvGrpSpPr>
+      <p:grpSpPr>
+        <a:xfrm>
+          <a:off x="0" y="0"/>
+          <a:ext cx="0" cy="0"/>
+          <a:chOff x="0" y="0"/>
+          <a:chExt cx="0" cy="0"/>
+        </a:xfrm>
+      </p:grpSpPr>
+      <p:sp>
+        <p:nvSpPr>
+          <p:cNvPr id="2" name="Slide Image Placeholder 1"/>
+          <p:cNvSpPr>
+            <a:spLocks noGrp="1" noRot="1" noChangeAspect="1"/>
+          </p:cNvSpPr>
+          <p:nvPr>
+            <p:ph type="sldImg"/>
+          </p:nvPr>
+        </p:nvSpPr>
+        <p:spPr/>
+      </p:sp>
+      <p:sp>
+        <p:nvSpPr>
+          <p:cNvPr id="3" name="Notes Placeholder 2"/>
+          <p:cNvSpPr>
+            <a:spLocks noGrp="1"/>
+          </p:cNvSpPr>
+          <p:nvPr>
+            <p:ph type="body" idx="1"/>
+          </p:nvPr>
+        </p:nvSpPr>
+        <p:spPr/>
+        <p:txBody>
+          <a:bodyPr/>
+          <a:lstStyle/>
+          <a:p>
+            <a:pPr marL="0" marR="0" lvl="0" indent="0" algn="l" defTabSz="914400" rtl="0" eaLnBrk="1" fontAlgn="auto" latinLnBrk="0" hangingPunct="1">
+              <a:lnSpc>
+                <a:spcPct val="100000"/>
+              </a:lnSpc>
+              <a:spcBef>
+                <a:spcPts val="0"/>
+              </a:spcBef>
+              <a:spcAft>
+                <a:spcPts val="0"/>
+              </a:spcAft>
+              <a:buClrTx/>
+              <a:buSzTx/>
+              <a:buFontTx/>
+              <a:buNone/>
+              <a:tabLst/>
+              <a:defRPr/>
+            </a:pPr>
+            <a:r>
+              <a:rPr lang="en-US" dirty="0"/>
+              <a:t>- Pulled the US vs the World for the year 2000 and 2016</a:t>
+            </a:r>
+          </a:p>
+          <a:p>
+            <a:pPr marL="0" marR="0" lvl="0" indent="0" algn="l" defTabSz="914400" rtl="0" eaLnBrk="1" fontAlgn="auto" latinLnBrk="0" hangingPunct="1">
+              <a:lnSpc>
+                <a:spcPct val="100000"/>
+              </a:lnSpc>
+              <a:spcBef>
+                <a:spcPts val="0"/>
+              </a:spcBef>
+              <a:spcAft>
+                <a:spcPts val="0"/>
+              </a:spcAft>
+              <a:buClrTx/>
+              <a:buSzTx/>
+              <a:buFontTx/>
+              <a:buNone/>
+              <a:tabLst/>
+              <a:defRPr/>
+            </a:pPr>
+            <a:r>
+              <a:rPr lang="en-US" dirty="0"/>
+              <a:t>- RESULT=</a:t>
+            </a:r>
+            <a:r>
+              <a:rPr lang="en-US" sz="1200" kern="1200" dirty="0">
+                <a:solidFill>
+                  <a:schemeClr val="tx1"/>
+                </a:solidFill>
+                <a:effectLst/>
+                <a:latin typeface="+mn-lt"/>
+                <a:ea typeface="+mn-ea"/>
+                <a:cs typeface="+mn-cs"/>
+              </a:rPr>
+              <a:t>From the data on the screen, from 2000 to 2016, the US smoking prevalence went down ~10% and the world went down ~7%. Additionally, the life expectancy went up ~2 years in the US and ~4.5 years worldwide. </a:t>
+            </a:r>
+          </a:p>
+          <a:p>
+            <a:endParaRPr lang="en-US" dirty="0"/>
+          </a:p>
+        </p:txBody>
+      </p:sp>
+      <p:sp>
+        <p:nvSpPr>
+          <p:cNvPr id="4" name="Slide Number Placeholder 3"/>
+          <p:cNvSpPr>
+            <a:spLocks noGrp="1"/>
+          </p:cNvSpPr>
+          <p:nvPr>
+            <p:ph type="sldNum" sz="quarter" idx="5"/>
+          </p:nvPr>
+        </p:nvSpPr>
+        <p:spPr/>
+        <p:txBody>
+          <a:bodyPr/>
+          <a:lstStyle/>
+          <a:p>
+            <a:fld id="{6D200C72-0EC8-464E-B557-D7B9905A301B}" type="slidenum">
+              <a:rPr lang="en-US" smtClean="0"/>
+              <a:t>6</a:t>
+            </a:fld>
+            <a:endParaRPr lang="en-US"/>
+          </a:p>
+        </p:txBody>
+      </p:sp>
+    </p:spTree>
+    <p:extLst>
+      <p:ext uri="{BB962C8B-B14F-4D97-AF65-F5344CB8AC3E}">
+        <p14:creationId xmlns:p14="http://schemas.microsoft.com/office/powerpoint/2010/main" val="3619989184"/>
+      </p:ext>
+    </p:extLst>
+  </p:cSld>
+  <p:clrMapOvr>
+    <a:masterClrMapping/>
+  </p:clrMapOvr>
+</p:notes>
 </file>
 
 <file path=ppt/slideLayouts/slideLayout1.xml><?xml version="1.0" encoding="utf-8"?>
@@ -385,7 +1374,7 @@
           <a:p>
             <a:fld id="{5057A2D0-D5FC-4802-B79D-8E5040FA0C96}" type="datetimeFigureOut">
               <a:rPr lang="en-US" smtClean="0"/>
-              <a:t>5/15/2020</a:t>
+              <a:t>5/16/2020</a:t>
             </a:fld>
             <a:endParaRPr lang="en-US"/>
           </a:p>
@@ -804,7 +1793,7 @@
           <a:p>
             <a:fld id="{5057A2D0-D5FC-4802-B79D-8E5040FA0C96}" type="datetimeFigureOut">
               <a:rPr lang="en-US" smtClean="0"/>
-              <a:t>5/15/2020</a:t>
+              <a:t>5/16/2020</a:t>
             </a:fld>
             <a:endParaRPr lang="en-US"/>
           </a:p>
@@ -1140,7 +2129,7 @@
           <a:p>
             <a:fld id="{5057A2D0-D5FC-4802-B79D-8E5040FA0C96}" type="datetimeFigureOut">
               <a:rPr lang="en-US" smtClean="0"/>
-              <a:t>5/15/2020</a:t>
+              <a:t>5/16/2020</a:t>
             </a:fld>
             <a:endParaRPr lang="en-US"/>
           </a:p>
@@ -1545,7 +2534,7 @@
           <a:p>
             <a:fld id="{5057A2D0-D5FC-4802-B79D-8E5040FA0C96}" type="datetimeFigureOut">
               <a:rPr lang="en-US" smtClean="0"/>
-              <a:t>5/15/2020</a:t>
+              <a:t>5/16/2020</a:t>
             </a:fld>
             <a:endParaRPr lang="en-US"/>
           </a:p>
@@ -2113,7 +3102,7 @@
           <a:p>
             <a:fld id="{5057A2D0-D5FC-4802-B79D-8E5040FA0C96}" type="datetimeFigureOut">
               <a:rPr lang="en-US" smtClean="0"/>
-              <a:t>5/15/2020</a:t>
+              <a:t>5/16/2020</a:t>
             </a:fld>
             <a:endParaRPr lang="en-US"/>
           </a:p>
@@ -2794,7 +3783,7 @@
           <a:p>
             <a:fld id="{5057A2D0-D5FC-4802-B79D-8E5040FA0C96}" type="datetimeFigureOut">
               <a:rPr lang="en-US" smtClean="0"/>
-              <a:t>5/15/2020</a:t>
+              <a:t>5/16/2020</a:t>
             </a:fld>
             <a:endParaRPr lang="en-US"/>
           </a:p>
@@ -3707,7 +4696,7 @@
           <a:p>
             <a:fld id="{5057A2D0-D5FC-4802-B79D-8E5040FA0C96}" type="datetimeFigureOut">
               <a:rPr lang="en-US" smtClean="0"/>
-              <a:t>5/15/2020</a:t>
+              <a:t>5/16/2020</a:t>
             </a:fld>
             <a:endParaRPr lang="en-US"/>
           </a:p>
@@ -4020,7 +5009,7 @@
           <a:p>
             <a:fld id="{5057A2D0-D5FC-4802-B79D-8E5040FA0C96}" type="datetimeFigureOut">
               <a:rPr lang="en-US" smtClean="0"/>
-              <a:t>5/15/2020</a:t>
+              <a:t>5/16/2020</a:t>
             </a:fld>
             <a:endParaRPr lang="en-US"/>
           </a:p>
@@ -4284,7 +5273,7 @@
           <a:p>
             <a:fld id="{5057A2D0-D5FC-4802-B79D-8E5040FA0C96}" type="datetimeFigureOut">
               <a:rPr lang="en-US" smtClean="0"/>
-              <a:t>5/15/2020</a:t>
+              <a:t>5/16/2020</a:t>
             </a:fld>
             <a:endParaRPr lang="en-US"/>
           </a:p>
@@ -4630,7 +5619,7 @@
           <a:p>
             <a:fld id="{5057A2D0-D5FC-4802-B79D-8E5040FA0C96}" type="datetimeFigureOut">
               <a:rPr lang="en-US" smtClean="0"/>
-              <a:t>5/15/2020</a:t>
+              <a:t>5/16/2020</a:t>
             </a:fld>
             <a:endParaRPr lang="en-US"/>
           </a:p>
@@ -5019,7 +6008,7 @@
           <a:p>
             <a:fld id="{5057A2D0-D5FC-4802-B79D-8E5040FA0C96}" type="datetimeFigureOut">
               <a:rPr lang="en-US" smtClean="0"/>
-              <a:t>5/15/2020</a:t>
+              <a:t>5/16/2020</a:t>
             </a:fld>
             <a:endParaRPr lang="en-US"/>
           </a:p>
@@ -5400,7 +6389,7 @@
           <a:p>
             <a:fld id="{5057A2D0-D5FC-4802-B79D-8E5040FA0C96}" type="datetimeFigureOut">
               <a:rPr lang="en-US" smtClean="0"/>
-              <a:t>5/15/2020</a:t>
+              <a:t>5/16/2020</a:t>
             </a:fld>
             <a:endParaRPr lang="en-US"/>
           </a:p>
@@ -5906,7 +6895,7 @@
           <a:p>
             <a:fld id="{5057A2D0-D5FC-4802-B79D-8E5040FA0C96}" type="datetimeFigureOut">
               <a:rPr lang="en-US" smtClean="0"/>
-              <a:t>5/15/2020</a:t>
+              <a:t>5/16/2020</a:t>
             </a:fld>
             <a:endParaRPr lang="en-US"/>
           </a:p>
@@ -6163,7 +7152,7 @@
           <a:p>
             <a:fld id="{5057A2D0-D5FC-4802-B79D-8E5040FA0C96}" type="datetimeFigureOut">
               <a:rPr lang="en-US" smtClean="0"/>
-              <a:t>5/15/2020</a:t>
+              <a:t>5/16/2020</a:t>
             </a:fld>
             <a:endParaRPr lang="en-US"/>
           </a:p>
@@ -6326,7 +7315,7 @@
           <a:p>
             <a:fld id="{5057A2D0-D5FC-4802-B79D-8E5040FA0C96}" type="datetimeFigureOut">
               <a:rPr lang="en-US" smtClean="0"/>
-              <a:t>5/15/2020</a:t>
+              <a:t>5/16/2020</a:t>
             </a:fld>
             <a:endParaRPr lang="en-US"/>
           </a:p>
@@ -6716,7 +7705,7 @@
           <a:p>
             <a:fld id="{5057A2D0-D5FC-4802-B79D-8E5040FA0C96}" type="datetimeFigureOut">
               <a:rPr lang="en-US" smtClean="0"/>
-              <a:t>5/15/2020</a:t>
+              <a:t>5/16/2020</a:t>
             </a:fld>
             <a:endParaRPr lang="en-US"/>
           </a:p>
@@ -7125,7 +8114,7 @@
           <a:p>
             <a:fld id="{5057A2D0-D5FC-4802-B79D-8E5040FA0C96}" type="datetimeFigureOut">
               <a:rPr lang="en-US" smtClean="0"/>
-              <a:t>5/15/2020</a:t>
+              <a:t>5/16/2020</a:t>
             </a:fld>
             <a:endParaRPr lang="en-US"/>
           </a:p>
@@ -7369,7 +8358,7 @@
           <a:p>
             <a:fld id="{5057A2D0-D5FC-4802-B79D-8E5040FA0C96}" type="datetimeFigureOut">
               <a:rPr lang="en-US" smtClean="0"/>
-              <a:t>5/15/2020</a:t>
+              <a:t>5/16/2020</a:t>
             </a:fld>
             <a:endParaRPr lang="en-US"/>
           </a:p>
@@ -7822,10 +8811,10 @@
       </p:grpSpPr>
       <p:sp>
         <p:nvSpPr>
-          <p:cNvPr id="2" name="Title 1">
+          <p:cNvPr id="4" name="Title 3">
             <a:extLst>
               <a:ext uri="{FF2B5EF4-FFF2-40B4-BE49-F238E27FC236}">
-                <a16:creationId xmlns:a16="http://schemas.microsoft.com/office/drawing/2014/main" id="{D4A99BA3-51C1-441C-962C-7AAD12AF225A}"/>
+                <a16:creationId xmlns:a16="http://schemas.microsoft.com/office/drawing/2014/main" id="{4C00172B-058A-450A-BBDF-61D52EEC5809}"/>
               </a:ext>
             </a:extLst>
           </p:cNvPr>
@@ -7833,7 +8822,7 @@
             <a:spLocks noGrp="1"/>
           </p:cNvSpPr>
           <p:nvPr>
-            <p:ph type="title"/>
+            <p:ph type="ctrTitle"/>
           </p:nvPr>
         </p:nvSpPr>
         <p:spPr/>
@@ -7843,17 +8832,17 @@
           <a:p>
             <a:r>
               <a:rPr lang="en-US" dirty="0"/>
-              <a:t>Overview</a:t>
-            </a:r>
-          </a:p>
-        </p:txBody>
-      </p:sp>
-      <p:sp>
-        <p:nvSpPr>
-          <p:cNvPr id="3" name="Content Placeholder 2">
+              <a:t>ETL Project	</a:t>
+            </a:r>
+          </a:p>
+        </p:txBody>
+      </p:sp>
+      <p:sp>
+        <p:nvSpPr>
+          <p:cNvPr id="5" name="Subtitle 4">
             <a:extLst>
               <a:ext uri="{FF2B5EF4-FFF2-40B4-BE49-F238E27FC236}">
-                <a16:creationId xmlns:a16="http://schemas.microsoft.com/office/drawing/2014/main" id="{1EDC73A7-5D31-4DC8-8C7C-0ED55AB54336}"/>
+                <a16:creationId xmlns:a16="http://schemas.microsoft.com/office/drawing/2014/main" id="{99AF1880-F89B-47FC-9726-FF1156BAF802}"/>
               </a:ext>
             </a:extLst>
           </p:cNvPr>
@@ -7861,7 +8850,7 @@
             <a:spLocks noGrp="1"/>
           </p:cNvSpPr>
           <p:nvPr>
-            <p:ph idx="1"/>
+            <p:ph type="subTitle" idx="1"/>
           </p:nvPr>
         </p:nvSpPr>
         <p:spPr/>
@@ -7871,88 +8860,15 @@
           <a:p>
             <a:r>
               <a:rPr lang="en-US" dirty="0"/>
-              <a:t>Data sets from </a:t>
-            </a:r>
-            <a:r>
-              <a:rPr lang="en-US" dirty="0" err="1"/>
-              <a:t>data.world</a:t>
-            </a:r>
-            <a:endParaRPr lang="en-US" dirty="0"/>
-          </a:p>
-          <a:p>
-            <a:r>
-              <a:rPr lang="en-US" dirty="0"/>
-              <a:t>CSV format, saved in Resources folder</a:t>
-            </a:r>
-          </a:p>
-          <a:p>
-            <a:r>
-              <a:rPr lang="en-US" dirty="0"/>
-              <a:t>1</a:t>
-            </a:r>
-            <a:r>
-              <a:rPr lang="en-US" baseline="30000" dirty="0"/>
-              <a:t>st</a:t>
-            </a:r>
-            <a:r>
-              <a:rPr lang="en-US" dirty="0"/>
-              <a:t> Set – Life Expectancy in years for a range of years per country</a:t>
-            </a:r>
-          </a:p>
-          <a:p>
-            <a:r>
-              <a:rPr lang="en-US" dirty="0"/>
-              <a:t>2</a:t>
-            </a:r>
-            <a:r>
-              <a:rPr lang="en-US" baseline="30000" dirty="0"/>
-              <a:t>nd</a:t>
-            </a:r>
-            <a:r>
-              <a:rPr lang="en-US" dirty="0"/>
-              <a:t> Set – Smoking Prevalence in percent of population per country</a:t>
-            </a:r>
-          </a:p>
-        </p:txBody>
-      </p:sp>
-      <p:pic>
-        <p:nvPicPr>
-          <p:cNvPr id="5" name="Picture 4" descr="A picture containing photo, wooden, room, hanging&#10;&#10;Description automatically generated">
-            <a:extLst>
-              <a:ext uri="{FF2B5EF4-FFF2-40B4-BE49-F238E27FC236}">
-                <a16:creationId xmlns:a16="http://schemas.microsoft.com/office/drawing/2014/main" id="{6AD8B31F-02DF-4711-B16B-2E189B53BE12}"/>
-              </a:ext>
-            </a:extLst>
-          </p:cNvPr>
-          <p:cNvPicPr/>
-          <p:nvPr/>
-        </p:nvPicPr>
-        <p:blipFill>
-          <a:blip r:embed="rId2">
-            <a:extLst>
-              <a:ext uri="{28A0092B-C50C-407E-A947-70E740481C1C}">
-                <a14:useLocalDpi xmlns:a14="http://schemas.microsoft.com/office/drawing/2010/main" val="0"/>
-              </a:ext>
-            </a:extLst>
-          </a:blip>
-          <a:stretch>
-            <a:fillRect/>
-          </a:stretch>
-        </p:blipFill>
-        <p:spPr>
-          <a:xfrm>
-            <a:off x="1145721" y="4769620"/>
-            <a:ext cx="9034272" cy="1005840"/>
-          </a:xfrm>
-          <a:prstGeom prst="rect">
-            <a:avLst/>
-          </a:prstGeom>
-        </p:spPr>
-      </p:pic>
+              <a:t>Ashlee Pounds</a:t>
+            </a:r>
+          </a:p>
+        </p:txBody>
+      </p:sp>
     </p:spTree>
     <p:extLst>
       <p:ext uri="{BB962C8B-B14F-4D97-AF65-F5344CB8AC3E}">
-        <p14:creationId xmlns:p14="http://schemas.microsoft.com/office/powerpoint/2010/main" val="2361636616"/>
+        <p14:creationId xmlns:p14="http://schemas.microsoft.com/office/powerpoint/2010/main" val="134453698"/>
       </p:ext>
     </p:extLst>
   </p:cSld>
@@ -7984,7 +8900,7 @@
           <p:cNvPr id="2" name="Title 1">
             <a:extLst>
               <a:ext uri="{FF2B5EF4-FFF2-40B4-BE49-F238E27FC236}">
-                <a16:creationId xmlns:a16="http://schemas.microsoft.com/office/drawing/2014/main" id="{F1C5CD07-A470-4C56-BF13-AF23CE0F21B7}"/>
+                <a16:creationId xmlns:a16="http://schemas.microsoft.com/office/drawing/2014/main" id="{D4A99BA3-51C1-441C-962C-7AAD12AF225A}"/>
               </a:ext>
             </a:extLst>
           </p:cNvPr>
@@ -8001,16 +8917,8 @@
           <a:lstStyle/>
           <a:p>
             <a:r>
-              <a:rPr lang="en-US" sz="4800" b="1" dirty="0"/>
-              <a:t>E</a:t>
-            </a:r>
-            <a:r>
-              <a:rPr lang="en-US" b="1" dirty="0"/>
-              <a:t>  </a:t>
-            </a:r>
-            <a:r>
               <a:rPr lang="en-US" dirty="0"/>
-              <a:t>T  L</a:t>
+              <a:t>Overview</a:t>
             </a:r>
           </a:p>
         </p:txBody>
@@ -8020,7 +8928,7 @@
           <p:cNvPr id="3" name="Content Placeholder 2">
             <a:extLst>
               <a:ext uri="{FF2B5EF4-FFF2-40B4-BE49-F238E27FC236}">
-                <a16:creationId xmlns:a16="http://schemas.microsoft.com/office/drawing/2014/main" id="{2E684427-4FB5-49F3-BE40-37AA0BFF5BAC}"/>
+                <a16:creationId xmlns:a16="http://schemas.microsoft.com/office/drawing/2014/main" id="{1EDC73A7-5D31-4DC8-8C7C-0ED55AB54336}"/>
               </a:ext>
             </a:extLst>
           </p:cNvPr>
@@ -8038,74 +8946,88 @@
           <a:p>
             <a:r>
               <a:rPr lang="en-US" dirty="0"/>
-              <a:t>Extracted CSVs in </a:t>
+              <a:t>Data sets from </a:t>
             </a:r>
             <a:r>
               <a:rPr lang="en-US" dirty="0" err="1"/>
-              <a:t>jupyter</a:t>
-            </a:r>
+              <a:t>data.world</a:t>
+            </a:r>
+            <a:endParaRPr lang="en-US" dirty="0"/>
+          </a:p>
+          <a:p>
             <a:r>
               <a:rPr lang="en-US" dirty="0"/>
-              <a:t> notebook with a pandas </a:t>
-            </a:r>
-            <a:r>
-              <a:rPr lang="en-US" dirty="0" err="1"/>
-              <a:t>dataframe</a:t>
-            </a:r>
-            <a:endParaRPr lang="en-US" dirty="0"/>
-          </a:p>
-          <a:p>
-            <a:endParaRPr lang="en-US" dirty="0"/>
+              <a:t>CSV format, saved in Resources folder</a:t>
+            </a:r>
+          </a:p>
+          <a:p>
+            <a:r>
+              <a:rPr lang="en-US" dirty="0"/>
+              <a:t>1</a:t>
+            </a:r>
+            <a:r>
+              <a:rPr lang="en-US" baseline="30000" dirty="0"/>
+              <a:t>st</a:t>
+            </a:r>
+            <a:r>
+              <a:rPr lang="en-US" dirty="0"/>
+              <a:t> Set – Life Expectancy in years for a range of years per country</a:t>
+            </a:r>
+          </a:p>
+          <a:p>
+            <a:r>
+              <a:rPr lang="en-US" dirty="0"/>
+              <a:t>2</a:t>
+            </a:r>
+            <a:r>
+              <a:rPr lang="en-US" baseline="30000" dirty="0"/>
+              <a:t>nd</a:t>
+            </a:r>
+            <a:r>
+              <a:rPr lang="en-US" dirty="0"/>
+              <a:t> Set – Smoking Prevalence in percent of population per country</a:t>
+            </a:r>
           </a:p>
         </p:txBody>
       </p:sp>
       <p:pic>
         <p:nvPicPr>
-          <p:cNvPr id="4" name="Picture 3" descr="A screenshot of a cell phone&#10;&#10;Description automatically generated">
+          <p:cNvPr id="5" name="Picture 4" descr="A picture containing photo, wooden, room, hanging&#10;&#10;Description automatically generated">
             <a:extLst>
               <a:ext uri="{FF2B5EF4-FFF2-40B4-BE49-F238E27FC236}">
-                <a16:creationId xmlns:a16="http://schemas.microsoft.com/office/drawing/2014/main" id="{09B6059A-18AA-4B2F-A9E0-7A2601B8FD4C}"/>
+                <a16:creationId xmlns:a16="http://schemas.microsoft.com/office/drawing/2014/main" id="{6AD8B31F-02DF-4711-B16B-2E189B53BE12}"/>
               </a:ext>
             </a:extLst>
           </p:cNvPr>
-          <p:cNvPicPr>
-            <a:picLocks noChangeAspect="1"/>
-          </p:cNvPicPr>
+          <p:cNvPicPr/>
           <p:nvPr/>
         </p:nvPicPr>
-        <p:blipFill rotWithShape="1">
-          <a:blip r:embed="rId2">
+        <p:blipFill>
+          <a:blip r:embed="rId3">
             <a:extLst>
               <a:ext uri="{28A0092B-C50C-407E-A947-70E740481C1C}">
                 <a14:useLocalDpi xmlns:a14="http://schemas.microsoft.com/office/drawing/2010/main" val="0"/>
               </a:ext>
             </a:extLst>
           </a:blip>
-          <a:srcRect l="2880" t="19619"/>
-          <a:stretch/>
+          <a:stretch>
+            <a:fillRect/>
+          </a:stretch>
         </p:blipFill>
-        <p:spPr bwMode="auto">
-          <a:xfrm>
-            <a:off x="1356056" y="3683871"/>
-            <a:ext cx="8938126" cy="1828800"/>
+        <p:spPr>
+          <a:xfrm>
+            <a:off x="869632" y="5098932"/>
+            <a:ext cx="9034272" cy="1005840"/>
           </a:xfrm>
           <a:prstGeom prst="rect">
             <a:avLst/>
           </a:prstGeom>
-          <a:ln>
-            <a:noFill/>
-          </a:ln>
-          <a:extLst>
-            <a:ext uri="{53640926-AAD7-44D8-BBD7-CCE9431645EC}">
-              <a14:shadowObscured xmlns:a14="http://schemas.microsoft.com/office/drawing/2010/main"/>
-            </a:ext>
-          </a:extLst>
         </p:spPr>
       </p:pic>
     </p:spTree>
     <p:extLst>
       <p:ext uri="{BB962C8B-B14F-4D97-AF65-F5344CB8AC3E}">
-        <p14:creationId xmlns:p14="http://schemas.microsoft.com/office/powerpoint/2010/main" val="3208409415"/>
+        <p14:creationId xmlns:p14="http://schemas.microsoft.com/office/powerpoint/2010/main" val="2361636616"/>
       </p:ext>
     </p:extLst>
   </p:cSld>
@@ -8154,20 +9076,16 @@
           <a:lstStyle/>
           <a:p>
             <a:r>
+              <a:rPr lang="en-US" sz="4800" b="1" dirty="0"/>
+              <a:t>E</a:t>
+            </a:r>
+            <a:r>
+              <a:rPr lang="en-US" b="1" dirty="0"/>
+              <a:t>  </a:t>
+            </a:r>
+            <a:r>
               <a:rPr lang="en-US" dirty="0"/>
-              <a:t>E </a:t>
-            </a:r>
-            <a:r>
-              <a:rPr lang="en-US" sz="4800" dirty="0"/>
-              <a:t> </a:t>
-            </a:r>
-            <a:r>
-              <a:rPr lang="en-US" sz="4800" b="1" dirty="0"/>
-              <a:t>T </a:t>
-            </a:r>
-            <a:r>
-              <a:rPr lang="en-US" dirty="0"/>
-              <a:t> L</a:t>
+              <a:t>T  L</a:t>
             </a:r>
           </a:p>
         </p:txBody>
@@ -8195,28 +9113,21 @@
           <a:p>
             <a:r>
               <a:rPr lang="en-US" dirty="0"/>
-              <a:t>Put data into Third Normal Form, with separate country code and country name table.</a:t>
-            </a:r>
-          </a:p>
-          <a:p>
+              <a:t>Extracted CSVs in </a:t>
+            </a:r>
+            <a:r>
+              <a:rPr lang="en-US" dirty="0" err="1"/>
+              <a:t>jupyter</a:t>
+            </a:r>
             <a:r>
               <a:rPr lang="en-US" dirty="0"/>
-              <a:t>Pulled only the columns wanted into a transformed data frame.</a:t>
-            </a:r>
-          </a:p>
-          <a:p>
-            <a:r>
-              <a:rPr lang="en-US" dirty="0"/>
-              <a:t>Cleaned the data to replace the blank cells “..” with “</a:t>
+              <a:t> notebook with a pandas </a:t>
             </a:r>
             <a:r>
               <a:rPr lang="en-US" dirty="0" err="1"/>
-              <a:t>NaN</a:t>
-            </a:r>
-            <a:r>
-              <a:rPr lang="en-US" dirty="0"/>
-              <a:t>”</a:t>
-            </a:r>
+              <a:t>dataframe</a:t>
+            </a:r>
+            <a:endParaRPr lang="en-US" dirty="0"/>
           </a:p>
           <a:p>
             <a:endParaRPr lang="en-US" dirty="0"/>
@@ -8225,46 +9136,10 @@
       </p:sp>
       <p:pic>
         <p:nvPicPr>
-          <p:cNvPr id="5" name="Picture 4" descr="A screenshot of a cell phone&#10;&#10;Description automatically generated">
+          <p:cNvPr id="4" name="Picture 3" descr="A screenshot of a cell phone&#10;&#10;Description automatically generated">
             <a:extLst>
               <a:ext uri="{FF2B5EF4-FFF2-40B4-BE49-F238E27FC236}">
-                <a16:creationId xmlns:a16="http://schemas.microsoft.com/office/drawing/2014/main" id="{A276B195-9879-49E4-8065-03A6698763EF}"/>
-              </a:ext>
-            </a:extLst>
-          </p:cNvPr>
-          <p:cNvPicPr>
-            <a:picLocks noChangeAspect="1"/>
-          </p:cNvPicPr>
-          <p:nvPr/>
-        </p:nvPicPr>
-        <p:blipFill>
-          <a:blip r:embed="rId2" cstate="print">
-            <a:extLst>
-              <a:ext uri="{28A0092B-C50C-407E-A947-70E740481C1C}">
-                <a14:useLocalDpi xmlns:a14="http://schemas.microsoft.com/office/drawing/2010/main" val="0"/>
-              </a:ext>
-            </a:extLst>
-          </a:blip>
-          <a:stretch>
-            <a:fillRect/>
-          </a:stretch>
-        </p:blipFill>
-        <p:spPr>
-          <a:xfrm>
-            <a:off x="535759" y="3979357"/>
-            <a:ext cx="8899444" cy="1828800"/>
-          </a:xfrm>
-          <a:prstGeom prst="rect">
-            <a:avLst/>
-          </a:prstGeom>
-        </p:spPr>
-      </p:pic>
-      <p:pic>
-        <p:nvPicPr>
-          <p:cNvPr id="6" name="Picture 5">
-            <a:extLst>
-              <a:ext uri="{FF2B5EF4-FFF2-40B4-BE49-F238E27FC236}">
-                <a16:creationId xmlns:a16="http://schemas.microsoft.com/office/drawing/2014/main" id="{095D69E4-08F0-4682-99C2-98464638DD3C}"/>
+                <a16:creationId xmlns:a16="http://schemas.microsoft.com/office/drawing/2014/main" id="{09B6059A-18AA-4B2F-A9E0-7A2601B8FD4C}"/>
               </a:ext>
             </a:extLst>
           </p:cNvPr>
@@ -8274,30 +9149,38 @@
           <p:nvPr/>
         </p:nvPicPr>
         <p:blipFill rotWithShape="1">
-          <a:blip r:embed="rId3" cstate="print">
+          <a:blip r:embed="rId3">
             <a:extLst>
               <a:ext uri="{28A0092B-C50C-407E-A947-70E740481C1C}">
                 <a14:useLocalDpi xmlns:a14="http://schemas.microsoft.com/office/drawing/2010/main" val="0"/>
               </a:ext>
             </a:extLst>
           </a:blip>
-          <a:srcRect l="-2311" t="-62765" r="37690" b="-125328"/>
+          <a:srcRect l="2880" t="19619"/>
           <a:stretch/>
         </p:blipFill>
-        <p:spPr>
-          <a:xfrm>
-            <a:off x="326754" y="5516876"/>
-            <a:ext cx="6674583" cy="1844040"/>
+        <p:spPr bwMode="auto">
+          <a:xfrm>
+            <a:off x="1356056" y="3683871"/>
+            <a:ext cx="8938126" cy="1828800"/>
           </a:xfrm>
           <a:prstGeom prst="rect">
             <a:avLst/>
           </a:prstGeom>
+          <a:ln>
+            <a:noFill/>
+          </a:ln>
+          <a:extLst>
+            <a:ext uri="{53640926-AAD7-44D8-BBD7-CCE9431645EC}">
+              <a14:shadowObscured xmlns:a14="http://schemas.microsoft.com/office/drawing/2010/main"/>
+            </a:ext>
+          </a:extLst>
         </p:spPr>
       </p:pic>
     </p:spTree>
     <p:extLst>
       <p:ext uri="{BB962C8B-B14F-4D97-AF65-F5344CB8AC3E}">
-        <p14:creationId xmlns:p14="http://schemas.microsoft.com/office/powerpoint/2010/main" val="4231224328"/>
+        <p14:creationId xmlns:p14="http://schemas.microsoft.com/office/powerpoint/2010/main" val="3208409415"/>
       </p:ext>
     </p:extLst>
   </p:cSld>
@@ -8347,7 +9230,7 @@
           <a:p>
             <a:r>
               <a:rPr lang="en-US" dirty="0"/>
-              <a:t>E  T </a:t>
+              <a:t>E </a:t>
             </a:r>
             <a:r>
               <a:rPr lang="en-US" sz="4800" dirty="0"/>
@@ -8355,9 +9238,12 @@
             </a:r>
             <a:r>
               <a:rPr lang="en-US" sz="4800" b="1" dirty="0"/>
-              <a:t>L</a:t>
-            </a:r>
-            <a:endParaRPr lang="en-US" dirty="0"/>
+              <a:t>T </a:t>
+            </a:r>
+            <a:r>
+              <a:rPr lang="en-US" dirty="0"/>
+              <a:t> L</a:t>
+            </a:r>
           </a:p>
         </p:txBody>
       </p:sp>
@@ -8384,31 +9270,27 @@
           <a:p>
             <a:r>
               <a:rPr lang="en-US" dirty="0"/>
-              <a:t>Schema create to initialize tables with Primary Key values.</a:t>
+              <a:t>Put data into Third Normal Form, with separate country code and country name table.</a:t>
             </a:r>
           </a:p>
           <a:p>
             <a:r>
               <a:rPr lang="en-US" dirty="0"/>
-              <a:t>Connection to Postgres server established in </a:t>
+              <a:t>Pulled only the columns wanted into a transformed data frame.</a:t>
+            </a:r>
+          </a:p>
+          <a:p>
+            <a:r>
+              <a:rPr lang="en-US" dirty="0"/>
+              <a:t>Cleaned the data to replace the blank cells “..” with “</a:t>
             </a:r>
             <a:r>
               <a:rPr lang="en-US" dirty="0" err="1"/>
-              <a:t>jupyter</a:t>
+              <a:t>NaN</a:t>
             </a:r>
             <a:r>
               <a:rPr lang="en-US" dirty="0"/>
-              <a:t> notebook.</a:t>
-            </a:r>
-          </a:p>
-          <a:p>
-            <a:r>
-              <a:rPr lang="en-US" dirty="0" err="1"/>
-              <a:t>Dataframes</a:t>
-            </a:r>
-            <a:r>
-              <a:rPr lang="en-US" dirty="0"/>
-              <a:t> loaded into Postgres server.</a:t>
+              <a:t>”</a:t>
             </a:r>
           </a:p>
           <a:p>
@@ -8421,43 +9303,7 @@
           <p:cNvPr id="5" name="Picture 4" descr="A screenshot of a cell phone&#10;&#10;Description automatically generated">
             <a:extLst>
               <a:ext uri="{FF2B5EF4-FFF2-40B4-BE49-F238E27FC236}">
-                <a16:creationId xmlns:a16="http://schemas.microsoft.com/office/drawing/2014/main" id="{9D49DA73-DB53-4A90-A6E2-0C832F004CA4}"/>
-              </a:ext>
-            </a:extLst>
-          </p:cNvPr>
-          <p:cNvPicPr>
-            <a:picLocks noChangeAspect="1"/>
-          </p:cNvPicPr>
-          <p:nvPr/>
-        </p:nvPicPr>
-        <p:blipFill>
-          <a:blip r:embed="rId2">
-            <a:extLst>
-              <a:ext uri="{28A0092B-C50C-407E-A947-70E740481C1C}">
-                <a14:useLocalDpi xmlns:a14="http://schemas.microsoft.com/office/drawing/2010/main" val="0"/>
-              </a:ext>
-            </a:extLst>
-          </a:blip>
-          <a:stretch>
-            <a:fillRect/>
-          </a:stretch>
-        </p:blipFill>
-        <p:spPr>
-          <a:xfrm>
-            <a:off x="571453" y="4136530"/>
-            <a:ext cx="2855966" cy="1463040"/>
-          </a:xfrm>
-          <a:prstGeom prst="rect">
-            <a:avLst/>
-          </a:prstGeom>
-        </p:spPr>
-      </p:pic>
-      <p:pic>
-        <p:nvPicPr>
-          <p:cNvPr id="6" name="Picture 5" descr="A screenshot of a social media post&#10;&#10;Description automatically generated">
-            <a:extLst>
-              <a:ext uri="{FF2B5EF4-FFF2-40B4-BE49-F238E27FC236}">
-                <a16:creationId xmlns:a16="http://schemas.microsoft.com/office/drawing/2014/main" id="{5394643A-C480-47E0-BEC1-5CA555EC4474}"/>
+                <a16:creationId xmlns:a16="http://schemas.microsoft.com/office/drawing/2014/main" id="{A276B195-9879-49E4-8065-03A6698763EF}"/>
               </a:ext>
             </a:extLst>
           </p:cNvPr>
@@ -8480,18 +9326,124 @@
         </p:blipFill>
         <p:spPr>
           <a:xfrm>
-            <a:off x="3871233" y="3963305"/>
-            <a:ext cx="7515654" cy="1972883"/>
+            <a:off x="535759" y="3979357"/>
+            <a:ext cx="8899444" cy="1828800"/>
           </a:xfrm>
           <a:prstGeom prst="rect">
             <a:avLst/>
           </a:prstGeom>
         </p:spPr>
       </p:pic>
+      <p:pic>
+        <p:nvPicPr>
+          <p:cNvPr id="6" name="Picture 5">
+            <a:extLst>
+              <a:ext uri="{FF2B5EF4-FFF2-40B4-BE49-F238E27FC236}">
+                <a16:creationId xmlns:a16="http://schemas.microsoft.com/office/drawing/2014/main" id="{095D69E4-08F0-4682-99C2-98464638DD3C}"/>
+              </a:ext>
+            </a:extLst>
+          </p:cNvPr>
+          <p:cNvPicPr>
+            <a:picLocks noChangeAspect="1"/>
+          </p:cNvPicPr>
+          <p:nvPr/>
+        </p:nvPicPr>
+        <p:blipFill rotWithShape="1">
+          <a:blip r:embed="rId4" cstate="print">
+            <a:extLst>
+              <a:ext uri="{28A0092B-C50C-407E-A947-70E740481C1C}">
+                <a14:useLocalDpi xmlns:a14="http://schemas.microsoft.com/office/drawing/2010/main" val="0"/>
+              </a:ext>
+            </a:extLst>
+          </a:blip>
+          <a:srcRect l="-2311" t="-62765" r="37690" b="-125328"/>
+          <a:stretch/>
+        </p:blipFill>
+        <p:spPr>
+          <a:xfrm>
+            <a:off x="326754" y="5516876"/>
+            <a:ext cx="6674583" cy="1844040"/>
+          </a:xfrm>
+          <a:prstGeom prst="rect">
+            <a:avLst/>
+          </a:prstGeom>
+        </p:spPr>
+      </p:pic>
+      <p:pic>
+        <p:nvPicPr>
+          <p:cNvPr id="7" name="Picture 6">
+            <a:extLst>
+              <a:ext uri="{FF2B5EF4-FFF2-40B4-BE49-F238E27FC236}">
+                <a16:creationId xmlns:a16="http://schemas.microsoft.com/office/drawing/2014/main" id="{805F33C7-3E4B-4E06-A051-C237CDB234B5}"/>
+              </a:ext>
+            </a:extLst>
+          </p:cNvPr>
+          <p:cNvPicPr>
+            <a:picLocks noChangeAspect="1"/>
+          </p:cNvPicPr>
+          <p:nvPr/>
+        </p:nvPicPr>
+        <p:blipFill>
+          <a:blip r:embed="rId5">
+            <a:extLst>
+              <a:ext uri="{28A0092B-C50C-407E-A947-70E740481C1C}">
+                <a14:useLocalDpi xmlns:a14="http://schemas.microsoft.com/office/drawing/2010/main" val="0"/>
+              </a:ext>
+            </a:extLst>
+          </a:blip>
+          <a:stretch>
+            <a:fillRect/>
+          </a:stretch>
+        </p:blipFill>
+        <p:spPr>
+          <a:xfrm>
+            <a:off x="9911682" y="5375902"/>
+            <a:ext cx="1889924" cy="1272650"/>
+          </a:xfrm>
+          <a:prstGeom prst="rect">
+            <a:avLst/>
+          </a:prstGeom>
+        </p:spPr>
+      </p:pic>
+      <p:sp>
+        <p:nvSpPr>
+          <p:cNvPr id="8" name="TextBox 7">
+            <a:extLst>
+              <a:ext uri="{FF2B5EF4-FFF2-40B4-BE49-F238E27FC236}">
+                <a16:creationId xmlns:a16="http://schemas.microsoft.com/office/drawing/2014/main" id="{4E7AEB51-DF8F-4E50-803A-50B6C23A1ED5}"/>
+              </a:ext>
+            </a:extLst>
+          </p:cNvPr>
+          <p:cNvSpPr txBox="1"/>
+          <p:nvPr/>
+        </p:nvSpPr>
+        <p:spPr>
+          <a:xfrm>
+            <a:off x="9788770" y="5077833"/>
+            <a:ext cx="1587639" cy="307777"/>
+          </a:xfrm>
+          <a:prstGeom prst="rect">
+            <a:avLst/>
+          </a:prstGeom>
+          <a:noFill/>
+        </p:spPr>
+        <p:txBody>
+          <a:bodyPr wrap="square" rtlCol="0">
+            <a:spAutoFit/>
+          </a:bodyPr>
+          <a:lstStyle/>
+          <a:p>
+            <a:r>
+              <a:rPr lang="en-US" sz="1400" dirty="0"/>
+              <a:t>Sample of data:</a:t>
+            </a:r>
+          </a:p>
+        </p:txBody>
+      </p:sp>
     </p:spTree>
     <p:extLst>
       <p:ext uri="{BB962C8B-B14F-4D97-AF65-F5344CB8AC3E}">
-        <p14:creationId xmlns:p14="http://schemas.microsoft.com/office/powerpoint/2010/main" val="3925332861"/>
+        <p14:creationId xmlns:p14="http://schemas.microsoft.com/office/powerpoint/2010/main" val="4231224328"/>
       </p:ext>
     </p:extLst>
   </p:cSld>
@@ -8578,7 +9530,31 @@
           <a:p>
             <a:r>
               <a:rPr lang="en-US" dirty="0"/>
-              <a:t>Two tables pulled using join</a:t>
+              <a:t>Schema create to initialize tables with Primary Key values.</a:t>
+            </a:r>
+          </a:p>
+          <a:p>
+            <a:r>
+              <a:rPr lang="en-US" dirty="0"/>
+              <a:t>Connection to Postgres server established in </a:t>
+            </a:r>
+            <a:r>
+              <a:rPr lang="en-US" dirty="0" err="1"/>
+              <a:t>jupyter</a:t>
+            </a:r>
+            <a:r>
+              <a:rPr lang="en-US" dirty="0"/>
+              <a:t> notebook.</a:t>
+            </a:r>
+          </a:p>
+          <a:p>
+            <a:r>
+              <a:rPr lang="en-US" dirty="0" err="1"/>
+              <a:t>Dataframes</a:t>
+            </a:r>
+            <a:r>
+              <a:rPr lang="en-US" dirty="0"/>
+              <a:t> loaded into Postgres server.</a:t>
             </a:r>
           </a:p>
           <a:p>
@@ -8588,10 +9564,10 @@
       </p:sp>
       <p:pic>
         <p:nvPicPr>
-          <p:cNvPr id="7" name="Picture 6" descr="A screenshot of a social media post&#10;&#10;Description automatically generated">
+          <p:cNvPr id="5" name="Picture 4" descr="A screenshot of a cell phone&#10;&#10;Description automatically generated">
             <a:extLst>
               <a:ext uri="{FF2B5EF4-FFF2-40B4-BE49-F238E27FC236}">
-                <a16:creationId xmlns:a16="http://schemas.microsoft.com/office/drawing/2014/main" id="{F1FF76A0-19FD-4A5B-9DF9-0E694CC1C209}"/>
+                <a16:creationId xmlns:a16="http://schemas.microsoft.com/office/drawing/2014/main" id="{9D49DA73-DB53-4A90-A6E2-0C832F004CA4}"/>
               </a:ext>
             </a:extLst>
           </p:cNvPr>
@@ -8601,7 +9577,7 @@
           <p:nvPr/>
         </p:nvPicPr>
         <p:blipFill>
-          <a:blip r:embed="rId2" cstate="print">
+          <a:blip r:embed="rId3">
             <a:extLst>
               <a:ext uri="{28A0092B-C50C-407E-A947-70E740481C1C}">
                 <a14:useLocalDpi xmlns:a14="http://schemas.microsoft.com/office/drawing/2010/main" val="0"/>
@@ -8614,8 +9590,8 @@
         </p:blipFill>
         <p:spPr>
           <a:xfrm>
-            <a:off x="114553" y="3578562"/>
-            <a:ext cx="5981447" cy="2211146"/>
+            <a:off x="571453" y="4136530"/>
+            <a:ext cx="2855966" cy="1463040"/>
           </a:xfrm>
           <a:prstGeom prst="rect">
             <a:avLst/>
@@ -8624,10 +9600,144 @@
       </p:pic>
       <p:pic>
         <p:nvPicPr>
-          <p:cNvPr id="8" name="Picture 7" descr="A screenshot of a cell phone&#10;&#10;Description automatically generated">
+          <p:cNvPr id="6" name="Picture 5" descr="A screenshot of a social media post&#10;&#10;Description automatically generated">
             <a:extLst>
               <a:ext uri="{FF2B5EF4-FFF2-40B4-BE49-F238E27FC236}">
-                <a16:creationId xmlns:a16="http://schemas.microsoft.com/office/drawing/2014/main" id="{AA176B9F-8B08-4397-92E4-95754A02A4C2}"/>
+                <a16:creationId xmlns:a16="http://schemas.microsoft.com/office/drawing/2014/main" id="{5394643A-C480-47E0-BEC1-5CA555EC4474}"/>
+              </a:ext>
+            </a:extLst>
+          </p:cNvPr>
+          <p:cNvPicPr>
+            <a:picLocks noChangeAspect="1"/>
+          </p:cNvPicPr>
+          <p:nvPr/>
+        </p:nvPicPr>
+        <p:blipFill>
+          <a:blip r:embed="rId4" cstate="print">
+            <a:extLst>
+              <a:ext uri="{28A0092B-C50C-407E-A947-70E740481C1C}">
+                <a14:useLocalDpi xmlns:a14="http://schemas.microsoft.com/office/drawing/2010/main" val="0"/>
+              </a:ext>
+            </a:extLst>
+          </a:blip>
+          <a:stretch>
+            <a:fillRect/>
+          </a:stretch>
+        </p:blipFill>
+        <p:spPr>
+          <a:xfrm>
+            <a:off x="3871233" y="3963305"/>
+            <a:ext cx="7515654" cy="1972883"/>
+          </a:xfrm>
+          <a:prstGeom prst="rect">
+            <a:avLst/>
+          </a:prstGeom>
+        </p:spPr>
+      </p:pic>
+    </p:spTree>
+    <p:extLst>
+      <p:ext uri="{BB962C8B-B14F-4D97-AF65-F5344CB8AC3E}">
+        <p14:creationId xmlns:p14="http://schemas.microsoft.com/office/powerpoint/2010/main" val="3925332861"/>
+      </p:ext>
+    </p:extLst>
+  </p:cSld>
+  <p:clrMapOvr>
+    <a:masterClrMapping/>
+  </p:clrMapOvr>
+</p:sld>
+</file>
+
+<file path=ppt/slides/slide6.xml><?xml version="1.0" encoding="utf-8"?>
+<p:sld xmlns:a="http://schemas.openxmlformats.org/drawingml/2006/main" xmlns:r="http://schemas.openxmlformats.org/officeDocument/2006/relationships" xmlns:p="http://schemas.openxmlformats.org/presentationml/2006/main">
+  <p:cSld>
+    <p:spTree>
+      <p:nvGrpSpPr>
+        <p:cNvPr id="1" name=""/>
+        <p:cNvGrpSpPr/>
+        <p:nvPr/>
+      </p:nvGrpSpPr>
+      <p:grpSpPr>
+        <a:xfrm>
+          <a:off x="0" y="0"/>
+          <a:ext cx="0" cy="0"/>
+          <a:chOff x="0" y="0"/>
+          <a:chExt cx="0" cy="0"/>
+        </a:xfrm>
+      </p:grpSpPr>
+      <p:sp>
+        <p:nvSpPr>
+          <p:cNvPr id="2" name="Title 1">
+            <a:extLst>
+              <a:ext uri="{FF2B5EF4-FFF2-40B4-BE49-F238E27FC236}">
+                <a16:creationId xmlns:a16="http://schemas.microsoft.com/office/drawing/2014/main" id="{F1C5CD07-A470-4C56-BF13-AF23CE0F21B7}"/>
+              </a:ext>
+            </a:extLst>
+          </p:cNvPr>
+          <p:cNvSpPr>
+            <a:spLocks noGrp="1"/>
+          </p:cNvSpPr>
+          <p:nvPr>
+            <p:ph type="title"/>
+          </p:nvPr>
+        </p:nvSpPr>
+        <p:spPr/>
+        <p:txBody>
+          <a:bodyPr/>
+          <a:lstStyle/>
+          <a:p>
+            <a:r>
+              <a:rPr lang="en-US" dirty="0"/>
+              <a:t>E  T </a:t>
+            </a:r>
+            <a:r>
+              <a:rPr lang="en-US" sz="4800" dirty="0"/>
+              <a:t> </a:t>
+            </a:r>
+            <a:r>
+              <a:rPr lang="en-US" sz="4800" b="1" dirty="0"/>
+              <a:t>L</a:t>
+            </a:r>
+            <a:endParaRPr lang="en-US" dirty="0"/>
+          </a:p>
+        </p:txBody>
+      </p:sp>
+      <p:sp>
+        <p:nvSpPr>
+          <p:cNvPr id="3" name="Content Placeholder 2">
+            <a:extLst>
+              <a:ext uri="{FF2B5EF4-FFF2-40B4-BE49-F238E27FC236}">
+                <a16:creationId xmlns:a16="http://schemas.microsoft.com/office/drawing/2014/main" id="{2E684427-4FB5-49F3-BE40-37AA0BFF5BAC}"/>
+              </a:ext>
+            </a:extLst>
+          </p:cNvPr>
+          <p:cNvSpPr>
+            <a:spLocks noGrp="1"/>
+          </p:cNvSpPr>
+          <p:nvPr>
+            <p:ph idx="1"/>
+          </p:nvPr>
+        </p:nvSpPr>
+        <p:spPr/>
+        <p:txBody>
+          <a:bodyPr/>
+          <a:lstStyle/>
+          <a:p>
+            <a:r>
+              <a:rPr lang="en-US" dirty="0"/>
+              <a:t>Two tables pulled using join on the country code</a:t>
+            </a:r>
+          </a:p>
+          <a:p>
+            <a:endParaRPr lang="en-US" dirty="0"/>
+          </a:p>
+        </p:txBody>
+      </p:sp>
+      <p:pic>
+        <p:nvPicPr>
+          <p:cNvPr id="7" name="Picture 6" descr="A screenshot of a social media post&#10;&#10;Description automatically generated">
+            <a:extLst>
+              <a:ext uri="{FF2B5EF4-FFF2-40B4-BE49-F238E27FC236}">
+                <a16:creationId xmlns:a16="http://schemas.microsoft.com/office/drawing/2014/main" id="{F1FF76A0-19FD-4A5B-9DF9-0E694CC1C209}"/>
               </a:ext>
             </a:extLst>
           </p:cNvPr>
@@ -8650,6 +9760,42 @@
         </p:blipFill>
         <p:spPr>
           <a:xfrm>
+            <a:off x="114553" y="3578562"/>
+            <a:ext cx="5981447" cy="2211146"/>
+          </a:xfrm>
+          <a:prstGeom prst="rect">
+            <a:avLst/>
+          </a:prstGeom>
+        </p:spPr>
+      </p:pic>
+      <p:pic>
+        <p:nvPicPr>
+          <p:cNvPr id="8" name="Picture 7" descr="A screenshot of a cell phone&#10;&#10;Description automatically generated">
+            <a:extLst>
+              <a:ext uri="{FF2B5EF4-FFF2-40B4-BE49-F238E27FC236}">
+                <a16:creationId xmlns:a16="http://schemas.microsoft.com/office/drawing/2014/main" id="{AA176B9F-8B08-4397-92E4-95754A02A4C2}"/>
+              </a:ext>
+            </a:extLst>
+          </p:cNvPr>
+          <p:cNvPicPr>
+            <a:picLocks noChangeAspect="1"/>
+          </p:cNvPicPr>
+          <p:nvPr/>
+        </p:nvPicPr>
+        <p:blipFill>
+          <a:blip r:embed="rId4" cstate="print">
+            <a:extLst>
+              <a:ext uri="{28A0092B-C50C-407E-A947-70E740481C1C}">
+                <a14:useLocalDpi xmlns:a14="http://schemas.microsoft.com/office/drawing/2010/main" val="0"/>
+              </a:ext>
+            </a:extLst>
+          </a:blip>
+          <a:stretch>
+            <a:fillRect/>
+          </a:stretch>
+        </p:blipFill>
+        <p:spPr>
+          <a:xfrm>
             <a:off x="6265609" y="3578562"/>
             <a:ext cx="5811838" cy="2277831"/>
           </a:xfrm>
@@ -8662,6 +9808,89 @@
     <p:extLst>
       <p:ext uri="{BB962C8B-B14F-4D97-AF65-F5344CB8AC3E}">
         <p14:creationId xmlns:p14="http://schemas.microsoft.com/office/powerpoint/2010/main" val="1615925309"/>
+      </p:ext>
+    </p:extLst>
+  </p:cSld>
+  <p:clrMapOvr>
+    <a:masterClrMapping/>
+  </p:clrMapOvr>
+</p:sld>
+</file>
+
+<file path=ppt/slides/slide7.xml><?xml version="1.0" encoding="utf-8"?>
+<p:sld xmlns:a="http://schemas.openxmlformats.org/drawingml/2006/main" xmlns:r="http://schemas.openxmlformats.org/officeDocument/2006/relationships" xmlns:p="http://schemas.openxmlformats.org/presentationml/2006/main">
+  <p:cSld>
+    <p:spTree>
+      <p:nvGrpSpPr>
+        <p:cNvPr id="1" name=""/>
+        <p:cNvGrpSpPr/>
+        <p:nvPr/>
+      </p:nvGrpSpPr>
+      <p:grpSpPr>
+        <a:xfrm>
+          <a:off x="0" y="0"/>
+          <a:ext cx="0" cy="0"/>
+          <a:chOff x="0" y="0"/>
+          <a:chExt cx="0" cy="0"/>
+        </a:xfrm>
+      </p:grpSpPr>
+      <p:sp>
+        <p:nvSpPr>
+          <p:cNvPr id="2" name="Title 1">
+            <a:extLst>
+              <a:ext uri="{FF2B5EF4-FFF2-40B4-BE49-F238E27FC236}">
+                <a16:creationId xmlns:a16="http://schemas.microsoft.com/office/drawing/2014/main" id="{2A95219E-D89E-4D31-A68E-FDFE0A3B0475}"/>
+              </a:ext>
+            </a:extLst>
+          </p:cNvPr>
+          <p:cNvSpPr>
+            <a:spLocks noGrp="1"/>
+          </p:cNvSpPr>
+          <p:nvPr>
+            <p:ph type="title"/>
+          </p:nvPr>
+        </p:nvSpPr>
+        <p:spPr/>
+        <p:txBody>
+          <a:bodyPr/>
+          <a:lstStyle/>
+          <a:p>
+            <a:r>
+              <a:rPr lang="en-US" dirty="0"/>
+              <a:t>Questions?</a:t>
+            </a:r>
+          </a:p>
+        </p:txBody>
+      </p:sp>
+      <p:sp>
+        <p:nvSpPr>
+          <p:cNvPr id="3" name="Text Placeholder 2">
+            <a:extLst>
+              <a:ext uri="{FF2B5EF4-FFF2-40B4-BE49-F238E27FC236}">
+                <a16:creationId xmlns:a16="http://schemas.microsoft.com/office/drawing/2014/main" id="{4B00F09D-7DF8-4898-B47F-35BDAFD1BF6A}"/>
+              </a:ext>
+            </a:extLst>
+          </p:cNvPr>
+          <p:cNvSpPr>
+            <a:spLocks noGrp="1"/>
+          </p:cNvSpPr>
+          <p:nvPr>
+            <p:ph type="body" sz="half" idx="2"/>
+          </p:nvPr>
+        </p:nvSpPr>
+        <p:spPr/>
+        <p:txBody>
+          <a:bodyPr/>
+          <a:lstStyle/>
+          <a:p>
+            <a:endParaRPr lang="en-US"/>
+          </a:p>
+        </p:txBody>
+      </p:sp>
+    </p:spTree>
+    <p:extLst>
+      <p:ext uri="{BB962C8B-B14F-4D97-AF65-F5344CB8AC3E}">
+        <p14:creationId xmlns:p14="http://schemas.microsoft.com/office/powerpoint/2010/main" val="2771402290"/>
       </p:ext>
     </p:extLst>
   </p:cSld>
@@ -8923,4 +10152,299 @@
     </a:ext>
   </a:extLst>
 </a:theme>
+</file>
+
+<file path=ppt/theme/theme2.xml><?xml version="1.0" encoding="utf-8"?>
+<a:theme xmlns:a="http://schemas.openxmlformats.org/drawingml/2006/main" name="Office Theme">
+  <a:themeElements>
+    <a:clrScheme name="Office">
+      <a:dk1>
+        <a:sysClr val="windowText" lastClr="000000"/>
+      </a:dk1>
+      <a:lt1>
+        <a:sysClr val="window" lastClr="FFFFFF"/>
+      </a:lt1>
+      <a:dk2>
+        <a:srgbClr val="44546A"/>
+      </a:dk2>
+      <a:lt2>
+        <a:srgbClr val="E7E6E6"/>
+      </a:lt2>
+      <a:accent1>
+        <a:srgbClr val="4472C4"/>
+      </a:accent1>
+      <a:accent2>
+        <a:srgbClr val="ED7D31"/>
+      </a:accent2>
+      <a:accent3>
+        <a:srgbClr val="A5A5A5"/>
+      </a:accent3>
+      <a:accent4>
+        <a:srgbClr val="FFC000"/>
+      </a:accent4>
+      <a:accent5>
+        <a:srgbClr val="5B9BD5"/>
+      </a:accent5>
+      <a:accent6>
+        <a:srgbClr val="70AD47"/>
+      </a:accent6>
+      <a:hlink>
+        <a:srgbClr val="0563C1"/>
+      </a:hlink>
+      <a:folHlink>
+        <a:srgbClr val="954F72"/>
+      </a:folHlink>
+    </a:clrScheme>
+    <a:fontScheme name="Office">
+      <a:majorFont>
+        <a:latin typeface="Calibri Light" panose="020F0302020204030204"/>
+        <a:ea typeface=""/>
+        <a:cs typeface=""/>
+        <a:font script="Jpan" typeface="游ゴシック Light"/>
+        <a:font script="Hang" typeface="맑은 고딕"/>
+        <a:font script="Hans" typeface="等线 Light"/>
+        <a:font script="Hant" typeface="新細明體"/>
+        <a:font script="Arab" typeface="Times New Roman"/>
+        <a:font script="Hebr" typeface="Times New Roman"/>
+        <a:font script="Thai" typeface="Angsana New"/>
+        <a:font script="Ethi" typeface="Nyala"/>
+        <a:font script="Beng" typeface="Vrinda"/>
+        <a:font script="Gujr" typeface="Shruti"/>
+        <a:font script="Khmr" typeface="MoolBoran"/>
+        <a:font script="Knda" typeface="Tunga"/>
+        <a:font script="Guru" typeface="Raavi"/>
+        <a:font script="Cans" typeface="Euphemia"/>
+        <a:font script="Cher" typeface="Plantagenet Cherokee"/>
+        <a:font script="Yiii" typeface="Microsoft Yi Baiti"/>
+        <a:font script="Tibt" typeface="Microsoft Himalaya"/>
+        <a:font script="Thaa" typeface="MV Boli"/>
+        <a:font script="Deva" typeface="Mangal"/>
+        <a:font script="Telu" typeface="Gautami"/>
+        <a:font script="Taml" typeface="Latha"/>
+        <a:font script="Syrc" typeface="Estrangelo Edessa"/>
+        <a:font script="Orya" typeface="Kalinga"/>
+        <a:font script="Mlym" typeface="Kartika"/>
+        <a:font script="Laoo" typeface="DokChampa"/>
+        <a:font script="Sinh" typeface="Iskoola Pota"/>
+        <a:font script="Mong" typeface="Mongolian Baiti"/>
+        <a:font script="Viet" typeface="Times New Roman"/>
+        <a:font script="Uigh" typeface="Microsoft Uighur"/>
+        <a:font script="Geor" typeface="Sylfaen"/>
+        <a:font script="Armn" typeface="Arial"/>
+        <a:font script="Bugi" typeface="Leelawadee UI"/>
+        <a:font script="Bopo" typeface="Microsoft JhengHei"/>
+        <a:font script="Java" typeface="Javanese Text"/>
+        <a:font script="Lisu" typeface="Segoe UI"/>
+        <a:font script="Mymr" typeface="Myanmar Text"/>
+        <a:font script="Nkoo" typeface="Ebrima"/>
+        <a:font script="Olck" typeface="Nirmala UI"/>
+        <a:font script="Osma" typeface="Ebrima"/>
+        <a:font script="Phag" typeface="Phagspa"/>
+        <a:font script="Syrn" typeface="Estrangelo Edessa"/>
+        <a:font script="Syrj" typeface="Estrangelo Edessa"/>
+        <a:font script="Syre" typeface="Estrangelo Edessa"/>
+        <a:font script="Sora" typeface="Nirmala UI"/>
+        <a:font script="Tale" typeface="Microsoft Tai Le"/>
+        <a:font script="Talu" typeface="Microsoft New Tai Lue"/>
+        <a:font script="Tfng" typeface="Ebrima"/>
+      </a:majorFont>
+      <a:minorFont>
+        <a:latin typeface="Calibri" panose="020F0502020204030204"/>
+        <a:ea typeface=""/>
+        <a:cs typeface=""/>
+        <a:font script="Jpan" typeface="游ゴシック"/>
+        <a:font script="Hang" typeface="맑은 고딕"/>
+        <a:font script="Hans" typeface="等线"/>
+        <a:font script="Hant" typeface="新細明體"/>
+        <a:font script="Arab" typeface="Arial"/>
+        <a:font script="Hebr" typeface="Arial"/>
+        <a:font script="Thai" typeface="Cordia New"/>
+        <a:font script="Ethi" typeface="Nyala"/>
+        <a:font script="Beng" typeface="Vrinda"/>
+        <a:font script="Gujr" typeface="Shruti"/>
+        <a:font script="Khmr" typeface="DaunPenh"/>
+        <a:font script="Knda" typeface="Tunga"/>
+        <a:font script="Guru" typeface="Raavi"/>
+        <a:font script="Cans" typeface="Euphemia"/>
+        <a:font script="Cher" typeface="Plantagenet Cherokee"/>
+        <a:font script="Yiii" typeface="Microsoft Yi Baiti"/>
+        <a:font script="Tibt" typeface="Microsoft Himalaya"/>
+        <a:font script="Thaa" typeface="MV Boli"/>
+        <a:font script="Deva" typeface="Mangal"/>
+        <a:font script="Telu" typeface="Gautami"/>
+        <a:font script="Taml" typeface="Latha"/>
+        <a:font script="Syrc" typeface="Estrangelo Edessa"/>
+        <a:font script="Orya" typeface="Kalinga"/>
+        <a:font script="Mlym" typeface="Kartika"/>
+        <a:font script="Laoo" typeface="DokChampa"/>
+        <a:font script="Sinh" typeface="Iskoola Pota"/>
+        <a:font script="Mong" typeface="Mongolian Baiti"/>
+        <a:font script="Viet" typeface="Arial"/>
+        <a:font script="Uigh" typeface="Microsoft Uighur"/>
+        <a:font script="Geor" typeface="Sylfaen"/>
+        <a:font script="Armn" typeface="Arial"/>
+        <a:font script="Bugi" typeface="Leelawadee UI"/>
+        <a:font script="Bopo" typeface="Microsoft JhengHei"/>
+        <a:font script="Java" typeface="Javanese Text"/>
+        <a:font script="Lisu" typeface="Segoe UI"/>
+        <a:font script="Mymr" typeface="Myanmar Text"/>
+        <a:font script="Nkoo" typeface="Ebrima"/>
+        <a:font script="Olck" typeface="Nirmala UI"/>
+        <a:font script="Osma" typeface="Ebrima"/>
+        <a:font script="Phag" typeface="Phagspa"/>
+        <a:font script="Syrn" typeface="Estrangelo Edessa"/>
+        <a:font script="Syrj" typeface="Estrangelo Edessa"/>
+        <a:font script="Syre" typeface="Estrangelo Edessa"/>
+        <a:font script="Sora" typeface="Nirmala UI"/>
+        <a:font script="Tale" typeface="Microsoft Tai Le"/>
+        <a:font script="Talu" typeface="Microsoft New Tai Lue"/>
+        <a:font script="Tfng" typeface="Ebrima"/>
+      </a:minorFont>
+    </a:fontScheme>
+    <a:fmtScheme name="Office">
+      <a:fillStyleLst>
+        <a:solidFill>
+          <a:schemeClr val="phClr"/>
+        </a:solidFill>
+        <a:gradFill rotWithShape="1">
+          <a:gsLst>
+            <a:gs pos="0">
+              <a:schemeClr val="phClr">
+                <a:lumMod val="110000"/>
+                <a:satMod val="105000"/>
+                <a:tint val="67000"/>
+              </a:schemeClr>
+            </a:gs>
+            <a:gs pos="50000">
+              <a:schemeClr val="phClr">
+                <a:lumMod val="105000"/>
+                <a:satMod val="103000"/>
+                <a:tint val="73000"/>
+              </a:schemeClr>
+            </a:gs>
+            <a:gs pos="100000">
+              <a:schemeClr val="phClr">
+                <a:lumMod val="105000"/>
+                <a:satMod val="109000"/>
+                <a:tint val="81000"/>
+              </a:schemeClr>
+            </a:gs>
+          </a:gsLst>
+          <a:lin ang="5400000" scaled="0"/>
+        </a:gradFill>
+        <a:gradFill rotWithShape="1">
+          <a:gsLst>
+            <a:gs pos="0">
+              <a:schemeClr val="phClr">
+                <a:satMod val="103000"/>
+                <a:lumMod val="102000"/>
+                <a:tint val="94000"/>
+              </a:schemeClr>
+            </a:gs>
+            <a:gs pos="50000">
+              <a:schemeClr val="phClr">
+                <a:satMod val="110000"/>
+                <a:lumMod val="100000"/>
+                <a:shade val="100000"/>
+              </a:schemeClr>
+            </a:gs>
+            <a:gs pos="100000">
+              <a:schemeClr val="phClr">
+                <a:lumMod val="99000"/>
+                <a:satMod val="120000"/>
+                <a:shade val="78000"/>
+              </a:schemeClr>
+            </a:gs>
+          </a:gsLst>
+          <a:lin ang="5400000" scaled="0"/>
+        </a:gradFill>
+      </a:fillStyleLst>
+      <a:lnStyleLst>
+        <a:ln w="6350" cap="flat" cmpd="sng" algn="ctr">
+          <a:solidFill>
+            <a:schemeClr val="phClr"/>
+          </a:solidFill>
+          <a:prstDash val="solid"/>
+          <a:miter lim="800000"/>
+        </a:ln>
+        <a:ln w="12700" cap="flat" cmpd="sng" algn="ctr">
+          <a:solidFill>
+            <a:schemeClr val="phClr"/>
+          </a:solidFill>
+          <a:prstDash val="solid"/>
+          <a:miter lim="800000"/>
+        </a:ln>
+        <a:ln w="19050" cap="flat" cmpd="sng" algn="ctr">
+          <a:solidFill>
+            <a:schemeClr val="phClr"/>
+          </a:solidFill>
+          <a:prstDash val="solid"/>
+          <a:miter lim="800000"/>
+        </a:ln>
+      </a:lnStyleLst>
+      <a:effectStyleLst>
+        <a:effectStyle>
+          <a:effectLst/>
+        </a:effectStyle>
+        <a:effectStyle>
+          <a:effectLst/>
+        </a:effectStyle>
+        <a:effectStyle>
+          <a:effectLst>
+            <a:outerShdw blurRad="57150" dist="19050" dir="5400000" algn="ctr" rotWithShape="0">
+              <a:srgbClr val="000000">
+                <a:alpha val="63000"/>
+              </a:srgbClr>
+            </a:outerShdw>
+          </a:effectLst>
+        </a:effectStyle>
+      </a:effectStyleLst>
+      <a:bgFillStyleLst>
+        <a:solidFill>
+          <a:schemeClr val="phClr"/>
+        </a:solidFill>
+        <a:solidFill>
+          <a:schemeClr val="phClr">
+            <a:tint val="95000"/>
+            <a:satMod val="170000"/>
+          </a:schemeClr>
+        </a:solidFill>
+        <a:gradFill rotWithShape="1">
+          <a:gsLst>
+            <a:gs pos="0">
+              <a:schemeClr val="phClr">
+                <a:tint val="93000"/>
+                <a:satMod val="150000"/>
+                <a:shade val="98000"/>
+                <a:lumMod val="102000"/>
+              </a:schemeClr>
+            </a:gs>
+            <a:gs pos="50000">
+              <a:schemeClr val="phClr">
+                <a:tint val="98000"/>
+                <a:satMod val="130000"/>
+                <a:shade val="90000"/>
+                <a:lumMod val="103000"/>
+              </a:schemeClr>
+            </a:gs>
+            <a:gs pos="100000">
+              <a:schemeClr val="phClr">
+                <a:shade val="63000"/>
+                <a:satMod val="120000"/>
+              </a:schemeClr>
+            </a:gs>
+          </a:gsLst>
+          <a:lin ang="5400000" scaled="0"/>
+        </a:gradFill>
+      </a:bgFillStyleLst>
+    </a:fmtScheme>
+  </a:themeElements>
+  <a:objectDefaults/>
+  <a:extraClrSchemeLst/>
+  <a:extLst>
+    <a:ext uri="{05A4C25C-085E-4340-85A3-A5531E510DB2}">
+      <thm15:themeFamily xmlns:thm15="http://schemas.microsoft.com/office/thememl/2012/main" name="Office Theme" id="{62F939B6-93AF-4DB8-9C6B-D6C7DFDC589F}" vid="{4A3C46E8-61CC-4603-A589-7422A47A8E4A}"/>
+    </a:ext>
+  </a:extLst>
+</a:theme>
 </file>
</xml_diff>